<commit_message>
Created new figures and updated the full draft. Things are pretty rough but starting to come together. Still need to add new experiments, add a full algorithm section, clarify the use of priors, fill out neural net discussion, and generally clean thigns up. We are already beyond the acceptable length.
</commit_message>
<xml_diff>
--- a/ICRA2016/bandits_docs/figures/dexnet_figures.pptx
+++ b/ICRA2016/bandits_docs/figures/dexnet_figures.pptx
@@ -8,6 +8,7 @@
     <p:sldId id="257" r:id="rId2"/>
     <p:sldId id="258" r:id="rId3"/>
     <p:sldId id="259" r:id="rId4"/>
+    <p:sldId id="260" r:id="rId5"/>
   </p:sldIdLst>
   <p:sldSz cx="18288000" cy="13716000"/>
   <p:notesSz cx="6858000" cy="9144000"/>
@@ -290,7 +291,7 @@
           <a:p>
             <a:fld id="{EBBD6627-F47C-C24D-89D5-71562B447545}" type="datetimeFigureOut">
               <a:rPr lang="en-US" smtClean="0"/>
-              <a:t>8/9/15</a:t>
+              <a:t>8/22/15</a:t>
             </a:fld>
             <a:endParaRPr lang="en-US"/>
           </a:p>
@@ -460,7 +461,7 @@
           <a:p>
             <a:fld id="{EBBD6627-F47C-C24D-89D5-71562B447545}" type="datetimeFigureOut">
               <a:rPr lang="en-US" smtClean="0"/>
-              <a:t>8/9/15</a:t>
+              <a:t>8/22/15</a:t>
             </a:fld>
             <a:endParaRPr lang="en-US"/>
           </a:p>
@@ -640,7 +641,7 @@
           <a:p>
             <a:fld id="{EBBD6627-F47C-C24D-89D5-71562B447545}" type="datetimeFigureOut">
               <a:rPr lang="en-US" smtClean="0"/>
-              <a:t>8/9/15</a:t>
+              <a:t>8/22/15</a:t>
             </a:fld>
             <a:endParaRPr lang="en-US"/>
           </a:p>
@@ -810,7 +811,7 @@
           <a:p>
             <a:fld id="{EBBD6627-F47C-C24D-89D5-71562B447545}" type="datetimeFigureOut">
               <a:rPr lang="en-US" smtClean="0"/>
-              <a:t>8/9/15</a:t>
+              <a:t>8/22/15</a:t>
             </a:fld>
             <a:endParaRPr lang="en-US"/>
           </a:p>
@@ -1056,7 +1057,7 @@
           <a:p>
             <a:fld id="{EBBD6627-F47C-C24D-89D5-71562B447545}" type="datetimeFigureOut">
               <a:rPr lang="en-US" smtClean="0"/>
-              <a:t>8/9/15</a:t>
+              <a:t>8/22/15</a:t>
             </a:fld>
             <a:endParaRPr lang="en-US"/>
           </a:p>
@@ -1344,7 +1345,7 @@
           <a:p>
             <a:fld id="{EBBD6627-F47C-C24D-89D5-71562B447545}" type="datetimeFigureOut">
               <a:rPr lang="en-US" smtClean="0"/>
-              <a:t>8/9/15</a:t>
+              <a:t>8/22/15</a:t>
             </a:fld>
             <a:endParaRPr lang="en-US"/>
           </a:p>
@@ -1766,7 +1767,7 @@
           <a:p>
             <a:fld id="{EBBD6627-F47C-C24D-89D5-71562B447545}" type="datetimeFigureOut">
               <a:rPr lang="en-US" smtClean="0"/>
-              <a:t>8/9/15</a:t>
+              <a:t>8/22/15</a:t>
             </a:fld>
             <a:endParaRPr lang="en-US"/>
           </a:p>
@@ -1884,7 +1885,7 @@
           <a:p>
             <a:fld id="{EBBD6627-F47C-C24D-89D5-71562B447545}" type="datetimeFigureOut">
               <a:rPr lang="en-US" smtClean="0"/>
-              <a:t>8/9/15</a:t>
+              <a:t>8/22/15</a:t>
             </a:fld>
             <a:endParaRPr lang="en-US"/>
           </a:p>
@@ -1979,7 +1980,7 @@
           <a:p>
             <a:fld id="{EBBD6627-F47C-C24D-89D5-71562B447545}" type="datetimeFigureOut">
               <a:rPr lang="en-US" smtClean="0"/>
-              <a:t>8/9/15</a:t>
+              <a:t>8/22/15</a:t>
             </a:fld>
             <a:endParaRPr lang="en-US"/>
           </a:p>
@@ -2256,7 +2257,7 @@
           <a:p>
             <a:fld id="{EBBD6627-F47C-C24D-89D5-71562B447545}" type="datetimeFigureOut">
               <a:rPr lang="en-US" smtClean="0"/>
-              <a:t>8/9/15</a:t>
+              <a:t>8/22/15</a:t>
             </a:fld>
             <a:endParaRPr lang="en-US"/>
           </a:p>
@@ -2509,7 +2510,7 @@
           <a:p>
             <a:fld id="{EBBD6627-F47C-C24D-89D5-71562B447545}" type="datetimeFigureOut">
               <a:rPr lang="en-US" smtClean="0"/>
-              <a:t>8/9/15</a:t>
+              <a:t>8/22/15</a:t>
             </a:fld>
             <a:endParaRPr lang="en-US"/>
           </a:p>
@@ -2722,7 +2723,7 @@
           <a:p>
             <a:fld id="{EBBD6627-F47C-C24D-89D5-71562B447545}" type="datetimeFigureOut">
               <a:rPr lang="en-US" smtClean="0"/>
-              <a:t>8/9/15</a:t>
+              <a:t>8/22/15</a:t>
             </a:fld>
             <a:endParaRPr lang="en-US"/>
           </a:p>
@@ -3408,6 +3409,143 @@
 </p:sld>
 </file>
 
+<file path=ppt/slides/slide4.xml><?xml version="1.0" encoding="utf-8"?>
+<p:sld xmlns:a="http://schemas.openxmlformats.org/drawingml/2006/main" xmlns:r="http://schemas.openxmlformats.org/officeDocument/2006/relationships" xmlns:p="http://schemas.openxmlformats.org/presentationml/2006/main">
+  <p:cSld>
+    <p:spTree>
+      <p:nvGrpSpPr>
+        <p:cNvPr id="1" name=""/>
+        <p:cNvGrpSpPr/>
+        <p:nvPr/>
+      </p:nvGrpSpPr>
+      <p:grpSpPr>
+        <a:xfrm>
+          <a:off x="0" y="0"/>
+          <a:ext cx="0" cy="0"/>
+          <a:chOff x="0" y="0"/>
+          <a:chExt cx="0" cy="0"/>
+        </a:xfrm>
+      </p:grpSpPr>
+      <p:pic>
+        <p:nvPicPr>
+          <p:cNvPr id="3" name="Picture 2" descr="bottle00.png"/>
+          <p:cNvPicPr>
+            <a:picLocks noChangeAspect="1"/>
+          </p:cNvPicPr>
+          <p:nvPr/>
+        </p:nvPicPr>
+        <p:blipFill>
+          <a:blip r:embed="rId2">
+            <a:extLst>
+              <a:ext uri="{28A0092B-C50C-407E-A947-70E740481C1C}">
+                <a14:useLocalDpi xmlns:a14="http://schemas.microsoft.com/office/drawing/2010/main" val="0"/>
+              </a:ext>
+            </a:extLst>
+          </a:blip>
+          <a:stretch>
+            <a:fillRect/>
+          </a:stretch>
+        </p:blipFill>
+        <p:spPr>
+          <a:xfrm>
+            <a:off x="5964918" y="770642"/>
+            <a:ext cx="17581544" cy="8254246"/>
+          </a:xfrm>
+          <a:prstGeom prst="rect">
+            <a:avLst/>
+          </a:prstGeom>
+        </p:spPr>
+      </p:pic>
+      <p:pic>
+        <p:nvPicPr>
+          <p:cNvPr id="7" name="Picture 6" descr="bottle_big_prior_avg_reward.png"/>
+          <p:cNvPicPr>
+            <a:picLocks noChangeAspect="1"/>
+          </p:cNvPicPr>
+          <p:nvPr/>
+        </p:nvPicPr>
+        <p:blipFill>
+          <a:blip r:embed="rId3">
+            <a:extLst>
+              <a:ext uri="{28A0092B-C50C-407E-A947-70E740481C1C}">
+                <a14:useLocalDpi xmlns:a14="http://schemas.microsoft.com/office/drawing/2010/main" val="0"/>
+              </a:ext>
+            </a:extLst>
+          </a:blip>
+          <a:stretch>
+            <a:fillRect/>
+          </a:stretch>
+        </p:blipFill>
+        <p:spPr>
+          <a:xfrm>
+            <a:off x="342851" y="-1"/>
+            <a:ext cx="12547649" cy="9196425"/>
+          </a:xfrm>
+          <a:prstGeom prst="rect">
+            <a:avLst/>
+          </a:prstGeom>
+        </p:spPr>
+      </p:pic>
+      <p:sp>
+        <p:nvSpPr>
+          <p:cNvPr id="8" name="Rectangle 7"/>
+          <p:cNvSpPr/>
+          <p:nvPr/>
+        </p:nvSpPr>
+        <p:spPr>
+          <a:xfrm>
+            <a:off x="3619500" y="381000"/>
+            <a:ext cx="6064250" cy="484892"/>
+          </a:xfrm>
+          <a:prstGeom prst="rect">
+            <a:avLst/>
+          </a:prstGeom>
+          <a:solidFill>
+            <a:schemeClr val="bg1"/>
+          </a:solidFill>
+          <a:ln>
+            <a:solidFill>
+              <a:schemeClr val="bg1"/>
+            </a:solidFill>
+          </a:ln>
+          <a:effectLst/>
+        </p:spPr>
+        <p:style>
+          <a:lnRef idx="1">
+            <a:schemeClr val="accent1"/>
+          </a:lnRef>
+          <a:fillRef idx="3">
+            <a:schemeClr val="accent1"/>
+          </a:fillRef>
+          <a:effectRef idx="2">
+            <a:schemeClr val="accent1"/>
+          </a:effectRef>
+          <a:fontRef idx="minor">
+            <a:schemeClr val="lt1"/>
+          </a:fontRef>
+        </p:style>
+        <p:txBody>
+          <a:bodyPr rtlCol="0" anchor="ctr"/>
+          <a:lstStyle/>
+          <a:p>
+            <a:pPr algn="ctr"/>
+            <a:endParaRPr lang="en-US"/>
+          </a:p>
+        </p:txBody>
+      </p:sp>
+    </p:spTree>
+    <p:extLst>
+      <p:ext uri="{BB962C8B-B14F-4D97-AF65-F5344CB8AC3E}">
+        <p14:creationId xmlns:p14="http://schemas.microsoft.com/office/powerpoint/2010/main" val="32792867"/>
+      </p:ext>
+    </p:extLst>
+  </p:cSld>
+  <p:clrMapOvr>
+    <a:masterClrMapping/>
+  </p:clrMapOvr>
+</p:sld>
+</file>
+
 <file path=ppt/theme/theme1.xml><?xml version="1.0" encoding="utf-8"?>
 <a:theme xmlns:a="http://schemas.openxmlformats.org/drawingml/2006/main" name="Office Theme">
   <a:themeElements>

</xml_diff>

<commit_message>
First full version of the paper with committed adobe illustrator figures
</commit_message>
<xml_diff>
--- a/ICRA2016/bandits_docs/figures/dexnet_figures.pptx
+++ b/ICRA2016/bandits_docs/figures/dexnet_figures.pptx
@@ -4,11 +4,20 @@
   <p:sldMasterIdLst>
     <p:sldMasterId id="2147483648" r:id="rId1"/>
   </p:sldMasterIdLst>
+  <p:notesMasterIdLst>
+    <p:notesMasterId r:id="rId12"/>
+  </p:notesMasterIdLst>
   <p:sldIdLst>
     <p:sldId id="257" r:id="rId2"/>
     <p:sldId id="258" r:id="rId3"/>
     <p:sldId id="259" r:id="rId4"/>
     <p:sldId id="260" r:id="rId5"/>
+    <p:sldId id="265" r:id="rId6"/>
+    <p:sldId id="266" r:id="rId7"/>
+    <p:sldId id="261" r:id="rId8"/>
+    <p:sldId id="264" r:id="rId9"/>
+    <p:sldId id="262" r:id="rId10"/>
+    <p:sldId id="263" r:id="rId11"/>
   </p:sldIdLst>
   <p:sldSz cx="18288000" cy="13716000"/>
   <p:notesSz cx="6858000" cy="9144000"/>
@@ -110,6 +119,452 @@
 </p:presentation>
 </file>
 
+<file path=ppt/notesMasters/notesMaster1.xml><?xml version="1.0" encoding="utf-8"?>
+<p:notesMaster xmlns:a="http://schemas.openxmlformats.org/drawingml/2006/main" xmlns:r="http://schemas.openxmlformats.org/officeDocument/2006/relationships" xmlns:p="http://schemas.openxmlformats.org/presentationml/2006/main">
+  <p:cSld>
+    <p:bg>
+      <p:bgRef idx="1001">
+        <a:schemeClr val="bg1"/>
+      </p:bgRef>
+    </p:bg>
+    <p:spTree>
+      <p:nvGrpSpPr>
+        <p:cNvPr id="1" name=""/>
+        <p:cNvGrpSpPr/>
+        <p:nvPr/>
+      </p:nvGrpSpPr>
+      <p:grpSpPr>
+        <a:xfrm>
+          <a:off x="0" y="0"/>
+          <a:ext cx="0" cy="0"/>
+          <a:chOff x="0" y="0"/>
+          <a:chExt cx="0" cy="0"/>
+        </a:xfrm>
+      </p:grpSpPr>
+      <p:sp>
+        <p:nvSpPr>
+          <p:cNvPr id="2" name="Header Placeholder 1"/>
+          <p:cNvSpPr>
+            <a:spLocks noGrp="1"/>
+          </p:cNvSpPr>
+          <p:nvPr>
+            <p:ph type="hdr" sz="quarter"/>
+          </p:nvPr>
+        </p:nvSpPr>
+        <p:spPr>
+          <a:xfrm>
+            <a:off x="0" y="0"/>
+            <a:ext cx="2971800" cy="457200"/>
+          </a:xfrm>
+          <a:prstGeom prst="rect">
+            <a:avLst/>
+          </a:prstGeom>
+        </p:spPr>
+        <p:txBody>
+          <a:bodyPr vert="horz" lIns="91440" tIns="45720" rIns="91440" bIns="45720" rtlCol="0"/>
+          <a:lstStyle>
+            <a:lvl1pPr algn="l">
+              <a:defRPr sz="1200"/>
+            </a:lvl1pPr>
+          </a:lstStyle>
+          <a:p>
+            <a:endParaRPr lang="en-US"/>
+          </a:p>
+        </p:txBody>
+      </p:sp>
+      <p:sp>
+        <p:nvSpPr>
+          <p:cNvPr id="3" name="Date Placeholder 2"/>
+          <p:cNvSpPr>
+            <a:spLocks noGrp="1"/>
+          </p:cNvSpPr>
+          <p:nvPr>
+            <p:ph type="dt" idx="1"/>
+          </p:nvPr>
+        </p:nvSpPr>
+        <p:spPr>
+          <a:xfrm>
+            <a:off x="3884613" y="0"/>
+            <a:ext cx="2971800" cy="457200"/>
+          </a:xfrm>
+          <a:prstGeom prst="rect">
+            <a:avLst/>
+          </a:prstGeom>
+        </p:spPr>
+        <p:txBody>
+          <a:bodyPr vert="horz" lIns="91440" tIns="45720" rIns="91440" bIns="45720" rtlCol="0"/>
+          <a:lstStyle>
+            <a:lvl1pPr algn="r">
+              <a:defRPr sz="1200"/>
+            </a:lvl1pPr>
+          </a:lstStyle>
+          <a:p>
+            <a:fld id="{5D461FAC-D1BC-8E41-9510-D55AAA652630}" type="datetimeFigureOut">
+              <a:rPr lang="en-US" smtClean="0"/>
+              <a:t>8/25/15</a:t>
+            </a:fld>
+            <a:endParaRPr lang="en-US"/>
+          </a:p>
+        </p:txBody>
+      </p:sp>
+      <p:sp>
+        <p:nvSpPr>
+          <p:cNvPr id="4" name="Slide Image Placeholder 3"/>
+          <p:cNvSpPr>
+            <a:spLocks noGrp="1" noRot="1" noChangeAspect="1"/>
+          </p:cNvSpPr>
+          <p:nvPr>
+            <p:ph type="sldImg" idx="2"/>
+          </p:nvPr>
+        </p:nvSpPr>
+        <p:spPr>
+          <a:xfrm>
+            <a:off x="1143000" y="685800"/>
+            <a:ext cx="4572000" cy="3429000"/>
+          </a:xfrm>
+          <a:prstGeom prst="rect">
+            <a:avLst/>
+          </a:prstGeom>
+          <a:noFill/>
+          <a:ln w="12700">
+            <a:solidFill>
+              <a:prstClr val="black"/>
+            </a:solidFill>
+          </a:ln>
+        </p:spPr>
+        <p:txBody>
+          <a:bodyPr vert="horz" lIns="91440" tIns="45720" rIns="91440" bIns="45720" rtlCol="0" anchor="ctr"/>
+          <a:lstStyle/>
+          <a:p>
+            <a:endParaRPr lang="en-US"/>
+          </a:p>
+        </p:txBody>
+      </p:sp>
+      <p:sp>
+        <p:nvSpPr>
+          <p:cNvPr id="5" name="Notes Placeholder 4"/>
+          <p:cNvSpPr>
+            <a:spLocks noGrp="1"/>
+          </p:cNvSpPr>
+          <p:nvPr>
+            <p:ph type="body" sz="quarter" idx="3"/>
+          </p:nvPr>
+        </p:nvSpPr>
+        <p:spPr>
+          <a:xfrm>
+            <a:off x="685800" y="4343400"/>
+            <a:ext cx="5486400" cy="4114800"/>
+          </a:xfrm>
+          <a:prstGeom prst="rect">
+            <a:avLst/>
+          </a:prstGeom>
+        </p:spPr>
+        <p:txBody>
+          <a:bodyPr vert="horz" lIns="91440" tIns="45720" rIns="91440" bIns="45720" rtlCol="0"/>
+          <a:lstStyle/>
+          <a:p>
+            <a:pPr lvl="0"/>
+            <a:r>
+              <a:rPr lang="en-US" smtClean="0"/>
+              <a:t>Click to edit Master text styles</a:t>
+            </a:r>
+          </a:p>
+          <a:p>
+            <a:pPr lvl="1"/>
+            <a:r>
+              <a:rPr lang="en-US" smtClean="0"/>
+              <a:t>Second level</a:t>
+            </a:r>
+          </a:p>
+          <a:p>
+            <a:pPr lvl="2"/>
+            <a:r>
+              <a:rPr lang="en-US" smtClean="0"/>
+              <a:t>Third level</a:t>
+            </a:r>
+          </a:p>
+          <a:p>
+            <a:pPr lvl="3"/>
+            <a:r>
+              <a:rPr lang="en-US" smtClean="0"/>
+              <a:t>Fourth level</a:t>
+            </a:r>
+          </a:p>
+          <a:p>
+            <a:pPr lvl="4"/>
+            <a:r>
+              <a:rPr lang="en-US" smtClean="0"/>
+              <a:t>Fifth level</a:t>
+            </a:r>
+            <a:endParaRPr lang="en-US"/>
+          </a:p>
+        </p:txBody>
+      </p:sp>
+      <p:sp>
+        <p:nvSpPr>
+          <p:cNvPr id="6" name="Footer Placeholder 5"/>
+          <p:cNvSpPr>
+            <a:spLocks noGrp="1"/>
+          </p:cNvSpPr>
+          <p:nvPr>
+            <p:ph type="ftr" sz="quarter" idx="4"/>
+          </p:nvPr>
+        </p:nvSpPr>
+        <p:spPr>
+          <a:xfrm>
+            <a:off x="0" y="8685213"/>
+            <a:ext cx="2971800" cy="457200"/>
+          </a:xfrm>
+          <a:prstGeom prst="rect">
+            <a:avLst/>
+          </a:prstGeom>
+        </p:spPr>
+        <p:txBody>
+          <a:bodyPr vert="horz" lIns="91440" tIns="45720" rIns="91440" bIns="45720" rtlCol="0" anchor="b"/>
+          <a:lstStyle>
+            <a:lvl1pPr algn="l">
+              <a:defRPr sz="1200"/>
+            </a:lvl1pPr>
+          </a:lstStyle>
+          <a:p>
+            <a:endParaRPr lang="en-US"/>
+          </a:p>
+        </p:txBody>
+      </p:sp>
+      <p:sp>
+        <p:nvSpPr>
+          <p:cNvPr id="7" name="Slide Number Placeholder 6"/>
+          <p:cNvSpPr>
+            <a:spLocks noGrp="1"/>
+          </p:cNvSpPr>
+          <p:nvPr>
+            <p:ph type="sldNum" sz="quarter" idx="5"/>
+          </p:nvPr>
+        </p:nvSpPr>
+        <p:spPr>
+          <a:xfrm>
+            <a:off x="3884613" y="8685213"/>
+            <a:ext cx="2971800" cy="457200"/>
+          </a:xfrm>
+          <a:prstGeom prst="rect">
+            <a:avLst/>
+          </a:prstGeom>
+        </p:spPr>
+        <p:txBody>
+          <a:bodyPr vert="horz" lIns="91440" tIns="45720" rIns="91440" bIns="45720" rtlCol="0" anchor="b"/>
+          <a:lstStyle>
+            <a:lvl1pPr algn="r">
+              <a:defRPr sz="1200"/>
+            </a:lvl1pPr>
+          </a:lstStyle>
+          <a:p>
+            <a:fld id="{5ABEA067-6F1F-D447-A7A4-FAEFB000F5EB}" type="slidenum">
+              <a:rPr lang="en-US" smtClean="0"/>
+              <a:t>‹#›</a:t>
+            </a:fld>
+            <a:endParaRPr lang="en-US"/>
+          </a:p>
+        </p:txBody>
+      </p:sp>
+    </p:spTree>
+    <p:extLst>
+      <p:ext uri="{BB962C8B-B14F-4D97-AF65-F5344CB8AC3E}">
+        <p14:creationId xmlns:p14="http://schemas.microsoft.com/office/powerpoint/2010/main" val="752572373"/>
+      </p:ext>
+    </p:extLst>
+  </p:cSld>
+  <p:clrMap bg1="lt1" tx1="dk1" bg2="lt2" tx2="dk2" accent1="accent1" accent2="accent2" accent3="accent3" accent4="accent4" accent5="accent5" accent6="accent6" hlink="hlink" folHlink="folHlink"/>
+  <p:notesStyle>
+    <a:lvl1pPr marL="0" algn="l" defTabSz="457200" rtl="0" eaLnBrk="1" latinLnBrk="0" hangingPunct="1">
+      <a:defRPr sz="1200" kern="1200">
+        <a:solidFill>
+          <a:schemeClr val="tx1"/>
+        </a:solidFill>
+        <a:latin typeface="+mn-lt"/>
+        <a:ea typeface="+mn-ea"/>
+        <a:cs typeface="+mn-cs"/>
+      </a:defRPr>
+    </a:lvl1pPr>
+    <a:lvl2pPr marL="457200" algn="l" defTabSz="457200" rtl="0" eaLnBrk="1" latinLnBrk="0" hangingPunct="1">
+      <a:defRPr sz="1200" kern="1200">
+        <a:solidFill>
+          <a:schemeClr val="tx1"/>
+        </a:solidFill>
+        <a:latin typeface="+mn-lt"/>
+        <a:ea typeface="+mn-ea"/>
+        <a:cs typeface="+mn-cs"/>
+      </a:defRPr>
+    </a:lvl2pPr>
+    <a:lvl3pPr marL="914400" algn="l" defTabSz="457200" rtl="0" eaLnBrk="1" latinLnBrk="0" hangingPunct="1">
+      <a:defRPr sz="1200" kern="1200">
+        <a:solidFill>
+          <a:schemeClr val="tx1"/>
+        </a:solidFill>
+        <a:latin typeface="+mn-lt"/>
+        <a:ea typeface="+mn-ea"/>
+        <a:cs typeface="+mn-cs"/>
+      </a:defRPr>
+    </a:lvl3pPr>
+    <a:lvl4pPr marL="1371600" algn="l" defTabSz="457200" rtl="0" eaLnBrk="1" latinLnBrk="0" hangingPunct="1">
+      <a:defRPr sz="1200" kern="1200">
+        <a:solidFill>
+          <a:schemeClr val="tx1"/>
+        </a:solidFill>
+        <a:latin typeface="+mn-lt"/>
+        <a:ea typeface="+mn-ea"/>
+        <a:cs typeface="+mn-cs"/>
+      </a:defRPr>
+    </a:lvl4pPr>
+    <a:lvl5pPr marL="1828800" algn="l" defTabSz="457200" rtl="0" eaLnBrk="1" latinLnBrk="0" hangingPunct="1">
+      <a:defRPr sz="1200" kern="1200">
+        <a:solidFill>
+          <a:schemeClr val="tx1"/>
+        </a:solidFill>
+        <a:latin typeface="+mn-lt"/>
+        <a:ea typeface="+mn-ea"/>
+        <a:cs typeface="+mn-cs"/>
+      </a:defRPr>
+    </a:lvl5pPr>
+    <a:lvl6pPr marL="2286000" algn="l" defTabSz="457200" rtl="0" eaLnBrk="1" latinLnBrk="0" hangingPunct="1">
+      <a:defRPr sz="1200" kern="1200">
+        <a:solidFill>
+          <a:schemeClr val="tx1"/>
+        </a:solidFill>
+        <a:latin typeface="+mn-lt"/>
+        <a:ea typeface="+mn-ea"/>
+        <a:cs typeface="+mn-cs"/>
+      </a:defRPr>
+    </a:lvl6pPr>
+    <a:lvl7pPr marL="2743200" algn="l" defTabSz="457200" rtl="0" eaLnBrk="1" latinLnBrk="0" hangingPunct="1">
+      <a:defRPr sz="1200" kern="1200">
+        <a:solidFill>
+          <a:schemeClr val="tx1"/>
+        </a:solidFill>
+        <a:latin typeface="+mn-lt"/>
+        <a:ea typeface="+mn-ea"/>
+        <a:cs typeface="+mn-cs"/>
+      </a:defRPr>
+    </a:lvl7pPr>
+    <a:lvl8pPr marL="3200400" algn="l" defTabSz="457200" rtl="0" eaLnBrk="1" latinLnBrk="0" hangingPunct="1">
+      <a:defRPr sz="1200" kern="1200">
+        <a:solidFill>
+          <a:schemeClr val="tx1"/>
+        </a:solidFill>
+        <a:latin typeface="+mn-lt"/>
+        <a:ea typeface="+mn-ea"/>
+        <a:cs typeface="+mn-cs"/>
+      </a:defRPr>
+    </a:lvl8pPr>
+    <a:lvl9pPr marL="3657600" algn="l" defTabSz="457200" rtl="0" eaLnBrk="1" latinLnBrk="0" hangingPunct="1">
+      <a:defRPr sz="1200" kern="1200">
+        <a:solidFill>
+          <a:schemeClr val="tx1"/>
+        </a:solidFill>
+        <a:latin typeface="+mn-lt"/>
+        <a:ea typeface="+mn-ea"/>
+        <a:cs typeface="+mn-cs"/>
+      </a:defRPr>
+    </a:lvl9pPr>
+  </p:notesStyle>
+</p:notesMaster>
+</file>
+
+<file path=ppt/notesSlides/notesSlide1.xml><?xml version="1.0" encoding="utf-8"?>
+<p:notes xmlns:a="http://schemas.openxmlformats.org/drawingml/2006/main" xmlns:r="http://schemas.openxmlformats.org/officeDocument/2006/relationships" xmlns:p="http://schemas.openxmlformats.org/presentationml/2006/main">
+  <p:cSld>
+    <p:spTree>
+      <p:nvGrpSpPr>
+        <p:cNvPr id="1" name=""/>
+        <p:cNvGrpSpPr/>
+        <p:nvPr/>
+      </p:nvGrpSpPr>
+      <p:grpSpPr>
+        <a:xfrm>
+          <a:off x="0" y="0"/>
+          <a:ext cx="0" cy="0"/>
+          <a:chOff x="0" y="0"/>
+          <a:chExt cx="0" cy="0"/>
+        </a:xfrm>
+      </p:grpSpPr>
+      <p:sp>
+        <p:nvSpPr>
+          <p:cNvPr id="2" name="Slide Image Placeholder 1"/>
+          <p:cNvSpPr>
+            <a:spLocks noGrp="1" noRot="1" noChangeAspect="1"/>
+          </p:cNvSpPr>
+          <p:nvPr>
+            <p:ph type="sldImg"/>
+          </p:nvPr>
+        </p:nvSpPr>
+        <p:spPr/>
+      </p:sp>
+      <p:sp>
+        <p:nvSpPr>
+          <p:cNvPr id="3" name="Notes Placeholder 2"/>
+          <p:cNvSpPr>
+            <a:spLocks noGrp="1"/>
+          </p:cNvSpPr>
+          <p:nvPr>
+            <p:ph type="body" idx="1"/>
+          </p:nvPr>
+        </p:nvSpPr>
+        <p:spPr/>
+        <p:txBody>
+          <a:bodyPr/>
+          <a:lstStyle/>
+          <a:p>
+            <a:r>
+              <a:rPr lang="en-US" dirty="0" smtClean="0"/>
+              <a:t>Bunch of </a:t>
+            </a:r>
+            <a:r>
+              <a:rPr lang="en-US" dirty="0" err="1" smtClean="0"/>
+              <a:t>Misc</a:t>
+            </a:r>
+            <a:r>
+              <a:rPr lang="en-US" dirty="0" smtClean="0"/>
+              <a:t> Stuff</a:t>
+            </a:r>
+            <a:endParaRPr lang="en-US" dirty="0"/>
+          </a:p>
+        </p:txBody>
+      </p:sp>
+      <p:sp>
+        <p:nvSpPr>
+          <p:cNvPr id="4" name="Slide Number Placeholder 3"/>
+          <p:cNvSpPr>
+            <a:spLocks noGrp="1"/>
+          </p:cNvSpPr>
+          <p:nvPr>
+            <p:ph type="sldNum" sz="quarter" idx="10"/>
+          </p:nvPr>
+        </p:nvSpPr>
+        <p:spPr/>
+        <p:txBody>
+          <a:bodyPr/>
+          <a:lstStyle/>
+          <a:p>
+            <a:fld id="{5ABEA067-6F1F-D447-A7A4-FAEFB000F5EB}" type="slidenum">
+              <a:rPr lang="en-US" smtClean="0"/>
+              <a:t>9</a:t>
+            </a:fld>
+            <a:endParaRPr lang="en-US"/>
+          </a:p>
+        </p:txBody>
+      </p:sp>
+    </p:spTree>
+    <p:extLst>
+      <p:ext uri="{BB962C8B-B14F-4D97-AF65-F5344CB8AC3E}">
+        <p14:creationId xmlns:p14="http://schemas.microsoft.com/office/powerpoint/2010/main" val="1583789275"/>
+      </p:ext>
+    </p:extLst>
+  </p:cSld>
+  <p:clrMapOvr>
+    <a:masterClrMapping/>
+  </p:clrMapOvr>
+</p:notes>
+</file>
+
 <file path=ppt/slideLayouts/slideLayout1.xml><?xml version="1.0" encoding="utf-8"?>
 <p:sldLayout xmlns:a="http://schemas.openxmlformats.org/drawingml/2006/main" xmlns:r="http://schemas.openxmlformats.org/officeDocument/2006/relationships" xmlns:p="http://schemas.openxmlformats.org/presentationml/2006/main" type="title" preserve="1">
   <p:cSld name="Title Slide">
@@ -139,7 +594,7 @@
         </p:nvSpPr>
         <p:spPr>
           <a:xfrm>
-            <a:off x="1371600" y="4260851"/>
+            <a:off x="1371600" y="4260855"/>
             <a:ext cx="15544800" cy="2940050"/>
           </a:xfrm>
         </p:spPr>
@@ -551,7 +1006,7 @@
         </p:nvSpPr>
         <p:spPr>
           <a:xfrm>
-            <a:off x="13258800" y="549277"/>
+            <a:off x="13258800" y="549281"/>
             <a:ext cx="4114800" cy="11703050"/>
           </a:xfrm>
         </p:spPr>
@@ -579,7 +1034,7 @@
         </p:nvSpPr>
         <p:spPr>
           <a:xfrm>
-            <a:off x="914400" y="549277"/>
+            <a:off x="914400" y="549281"/>
             <a:ext cx="12039600" cy="11703050"/>
           </a:xfrm>
         </p:spPr>
@@ -901,7 +1356,7 @@
         </p:nvSpPr>
         <p:spPr>
           <a:xfrm>
-            <a:off x="1444626" y="8813801"/>
+            <a:off x="1444626" y="8813805"/>
             <a:ext cx="15544800" cy="2724150"/>
           </a:xfrm>
         </p:spPr>
@@ -1170,7 +1625,7 @@
         </p:nvSpPr>
         <p:spPr>
           <a:xfrm>
-            <a:off x="914400" y="3200401"/>
+            <a:off x="914400" y="3200405"/>
             <a:ext cx="8077200" cy="9051926"/>
           </a:xfrm>
         </p:spPr>
@@ -1255,7 +1710,7 @@
         </p:nvSpPr>
         <p:spPr>
           <a:xfrm>
-            <a:off x="9296400" y="3200401"/>
+            <a:off x="9296400" y="3200405"/>
             <a:ext cx="8077200" cy="9051926"/>
           </a:xfrm>
         </p:spPr>
@@ -1612,7 +2067,7 @@
         </p:nvSpPr>
         <p:spPr>
           <a:xfrm>
-            <a:off x="9290051" y="3070226"/>
+            <a:off x="9290055" y="3070226"/>
             <a:ext cx="8083550" cy="1279524"/>
           </a:xfrm>
         </p:spPr>
@@ -1677,7 +2132,7 @@
         </p:nvSpPr>
         <p:spPr>
           <a:xfrm>
-            <a:off x="9290051" y="4349750"/>
+            <a:off x="9290055" y="4349750"/>
             <a:ext cx="8083550" cy="7902576"/>
           </a:xfrm>
         </p:spPr>
@@ -2070,7 +2525,7 @@
         </p:nvSpPr>
         <p:spPr>
           <a:xfrm>
-            <a:off x="914401" y="546100"/>
+            <a:off x="914405" y="546100"/>
             <a:ext cx="6016626" cy="2324100"/>
           </a:xfrm>
         </p:spPr>
@@ -2102,7 +2557,7 @@
         </p:nvSpPr>
         <p:spPr>
           <a:xfrm>
-            <a:off x="7150100" y="546101"/>
+            <a:off x="7150100" y="546105"/>
             <a:ext cx="10223500" cy="11706226"/>
           </a:xfrm>
         </p:spPr>
@@ -2187,7 +2642,7 @@
         </p:nvSpPr>
         <p:spPr>
           <a:xfrm>
-            <a:off x="914401" y="2870201"/>
+            <a:off x="914405" y="2870205"/>
             <a:ext cx="6016626" cy="9382126"/>
           </a:xfrm>
         </p:spPr>
@@ -2638,7 +3093,7 @@
         </p:nvSpPr>
         <p:spPr>
           <a:xfrm>
-            <a:off x="914400" y="3200401"/>
+            <a:off x="914400" y="3200405"/>
             <a:ext cx="16459200" cy="9051926"/>
           </a:xfrm>
           <a:prstGeom prst="rect">
@@ -2700,7 +3155,7 @@
         </p:nvSpPr>
         <p:spPr>
           <a:xfrm>
-            <a:off x="914400" y="12712701"/>
+            <a:off x="914400" y="12712705"/>
             <a:ext cx="4267200" cy="730250"/>
           </a:xfrm>
           <a:prstGeom prst="rect">
@@ -2741,7 +3196,7 @@
         </p:nvSpPr>
         <p:spPr>
           <a:xfrm>
-            <a:off x="6248400" y="12712701"/>
+            <a:off x="6248400" y="12712705"/>
             <a:ext cx="5791200" cy="730250"/>
           </a:xfrm>
           <a:prstGeom prst="rect">
@@ -2778,7 +3233,7 @@
         </p:nvSpPr>
         <p:spPr>
           <a:xfrm>
-            <a:off x="13106400" y="12712701"/>
+            <a:off x="13106400" y="12712705"/>
             <a:ext cx="4267200" cy="730250"/>
           </a:xfrm>
           <a:prstGeom prst="rect">
@@ -3120,8 +3575,8 @@
         </p:blipFill>
         <p:spPr>
           <a:xfrm>
-            <a:off x="0" y="1"/>
-            <a:ext cx="12564733" cy="8791264"/>
+            <a:off x="3" y="2"/>
+            <a:ext cx="12564734" cy="8791264"/>
           </a:xfrm>
           <a:prstGeom prst="rect">
             <a:avLst/>
@@ -3150,7 +3605,7 @@
         </p:blipFill>
         <p:spPr>
           <a:xfrm>
-            <a:off x="6746421" y="747982"/>
+            <a:off x="6746422" y="747982"/>
             <a:ext cx="16230600" cy="7620000"/>
           </a:xfrm>
           <a:prstGeom prst="rect">
@@ -3168,6 +3623,993 @@
   <p:clrMapOvr>
     <a:masterClrMapping/>
   </p:clrMapOvr>
+</p:sld>
+</file>
+
+<file path=ppt/slides/slide10.xml><?xml version="1.0" encoding="utf-8"?>
+<p:sld xmlns:a="http://schemas.openxmlformats.org/drawingml/2006/main" xmlns:r="http://schemas.openxmlformats.org/officeDocument/2006/relationships" xmlns:p="http://schemas.openxmlformats.org/presentationml/2006/main">
+  <p:cSld>
+    <p:spTree>
+      <p:nvGrpSpPr>
+        <p:cNvPr id="1" name=""/>
+        <p:cNvGrpSpPr/>
+        <p:nvPr/>
+      </p:nvGrpSpPr>
+      <p:grpSpPr>
+        <a:xfrm>
+          <a:off x="0" y="0"/>
+          <a:ext cx="0" cy="0"/>
+          <a:chOff x="0" y="0"/>
+          <a:chExt cx="0" cy="0"/>
+        </a:xfrm>
+      </p:grpSpPr>
+      <p:grpSp>
+        <p:nvGrpSpPr>
+          <p:cNvPr id="2" name="Group 1"/>
+          <p:cNvGrpSpPr/>
+          <p:nvPr/>
+        </p:nvGrpSpPr>
+        <p:grpSpPr>
+          <a:xfrm>
+            <a:off x="7551790" y="1023147"/>
+            <a:ext cx="3097528" cy="2453546"/>
+            <a:chOff x="3846304" y="182334"/>
+            <a:chExt cx="1548764" cy="1226773"/>
+          </a:xfrm>
+        </p:grpSpPr>
+        <p:sp>
+          <p:nvSpPr>
+            <p:cNvPr id="48" name="Oval 47"/>
+            <p:cNvSpPr/>
+            <p:nvPr/>
+          </p:nvSpPr>
+          <p:spPr>
+            <a:xfrm>
+              <a:off x="3969784" y="182334"/>
+              <a:ext cx="1331800" cy="1226773"/>
+            </a:xfrm>
+            <a:prstGeom prst="ellipse">
+              <a:avLst/>
+            </a:prstGeom>
+          </p:spPr>
+          <p:style>
+            <a:lnRef idx="2">
+              <a:schemeClr val="dk1"/>
+            </a:lnRef>
+            <a:fillRef idx="1">
+              <a:schemeClr val="lt1"/>
+            </a:fillRef>
+            <a:effectRef idx="0">
+              <a:schemeClr val="dk1"/>
+            </a:effectRef>
+            <a:fontRef idx="minor">
+              <a:schemeClr val="dk1"/>
+            </a:fontRef>
+          </p:style>
+          <p:txBody>
+            <a:bodyPr rtlCol="0" anchor="ctr"/>
+            <a:lstStyle/>
+            <a:p>
+              <a:pPr algn="ctr"/>
+              <a:endParaRPr lang="en-US" dirty="0"/>
+            </a:p>
+          </p:txBody>
+        </p:sp>
+        <p:sp>
+          <p:nvSpPr>
+            <p:cNvPr id="26" name="TextBox 25"/>
+            <p:cNvSpPr txBox="1"/>
+            <p:nvPr/>
+          </p:nvSpPr>
+          <p:spPr>
+            <a:xfrm>
+              <a:off x="3846304" y="470358"/>
+              <a:ext cx="1548764" cy="415499"/>
+            </a:xfrm>
+            <a:prstGeom prst="rect">
+              <a:avLst/>
+            </a:prstGeom>
+            <a:noFill/>
+          </p:spPr>
+          <p:txBody>
+            <a:bodyPr wrap="square" rtlCol="0">
+              <a:spAutoFit/>
+            </a:bodyPr>
+            <a:lstStyle/>
+            <a:p>
+              <a:pPr algn="ctr"/>
+              <a:r>
+                <a:rPr lang="en-US" sz="4800" dirty="0"/>
+                <a:t> </a:t>
+              </a:r>
+              <a:r>
+                <a:rPr lang="en-US" sz="4800" dirty="0">
+                  <a:latin typeface="Times New Roman"/>
+                  <a:cs typeface="Times New Roman"/>
+                </a:rPr>
+                <a:t>Approach</a:t>
+              </a:r>
+              <a:endParaRPr lang="en-US" dirty="0">
+                <a:latin typeface="Times New Roman"/>
+                <a:cs typeface="Times New Roman"/>
+              </a:endParaRPr>
+            </a:p>
+          </p:txBody>
+        </p:sp>
+      </p:grpSp>
+      <p:grpSp>
+        <p:nvGrpSpPr>
+          <p:cNvPr id="43" name="Group 42"/>
+          <p:cNvGrpSpPr/>
+          <p:nvPr/>
+        </p:nvGrpSpPr>
+        <p:grpSpPr>
+          <a:xfrm>
+            <a:off x="3090421" y="4873133"/>
+            <a:ext cx="2671658" cy="2453546"/>
+            <a:chOff x="3965755" y="182334"/>
+            <a:chExt cx="1335829" cy="1226773"/>
+          </a:xfrm>
+        </p:grpSpPr>
+        <p:sp>
+          <p:nvSpPr>
+            <p:cNvPr id="44" name="Oval 43"/>
+            <p:cNvSpPr/>
+            <p:nvPr/>
+          </p:nvSpPr>
+          <p:spPr>
+            <a:xfrm>
+              <a:off x="3969784" y="182334"/>
+              <a:ext cx="1331800" cy="1226773"/>
+            </a:xfrm>
+            <a:prstGeom prst="ellipse">
+              <a:avLst/>
+            </a:prstGeom>
+          </p:spPr>
+          <p:style>
+            <a:lnRef idx="2">
+              <a:schemeClr val="dk1"/>
+            </a:lnRef>
+            <a:fillRef idx="1">
+              <a:schemeClr val="lt1"/>
+            </a:fillRef>
+            <a:effectRef idx="0">
+              <a:schemeClr val="dk1"/>
+            </a:effectRef>
+            <a:fontRef idx="minor">
+              <a:schemeClr val="dk1"/>
+            </a:fontRef>
+          </p:style>
+          <p:txBody>
+            <a:bodyPr rtlCol="0" anchor="ctr"/>
+            <a:lstStyle/>
+            <a:p>
+              <a:pPr algn="ctr"/>
+              <a:endParaRPr lang="en-US" dirty="0"/>
+            </a:p>
+          </p:txBody>
+        </p:sp>
+        <p:sp>
+          <p:nvSpPr>
+            <p:cNvPr id="45" name="TextBox 44"/>
+            <p:cNvSpPr txBox="1"/>
+            <p:nvPr/>
+          </p:nvSpPr>
+          <p:spPr>
+            <a:xfrm>
+              <a:off x="3965755" y="470358"/>
+              <a:ext cx="1277883" cy="415499"/>
+            </a:xfrm>
+            <a:prstGeom prst="rect">
+              <a:avLst/>
+            </a:prstGeom>
+            <a:noFill/>
+          </p:spPr>
+          <p:txBody>
+            <a:bodyPr wrap="square" rtlCol="0">
+              <a:spAutoFit/>
+            </a:bodyPr>
+            <a:lstStyle/>
+            <a:p>
+              <a:pPr algn="ctr"/>
+              <a:r>
+                <a:rPr lang="en-US" sz="4800" dirty="0"/>
+                <a:t> </a:t>
+              </a:r>
+              <a:r>
+                <a:rPr lang="en-US" sz="4800" dirty="0">
+                  <a:latin typeface="Times New Roman"/>
+                  <a:cs typeface="Times New Roman"/>
+                </a:rPr>
+                <a:t>Contacts</a:t>
+              </a:r>
+              <a:endParaRPr lang="en-US" dirty="0">
+                <a:latin typeface="Times New Roman"/>
+                <a:cs typeface="Times New Roman"/>
+              </a:endParaRPr>
+            </a:p>
+          </p:txBody>
+        </p:sp>
+      </p:grpSp>
+      <p:grpSp>
+        <p:nvGrpSpPr>
+          <p:cNvPr id="46" name="Group 45"/>
+          <p:cNvGrpSpPr/>
+          <p:nvPr/>
+        </p:nvGrpSpPr>
+        <p:grpSpPr>
+          <a:xfrm>
+            <a:off x="12142786" y="4873133"/>
+            <a:ext cx="2663600" cy="2453546"/>
+            <a:chOff x="3969784" y="182334"/>
+            <a:chExt cx="1331800" cy="1226773"/>
+          </a:xfrm>
+        </p:grpSpPr>
+        <p:sp>
+          <p:nvSpPr>
+            <p:cNvPr id="51" name="Oval 50"/>
+            <p:cNvSpPr/>
+            <p:nvPr/>
+          </p:nvSpPr>
+          <p:spPr>
+            <a:xfrm>
+              <a:off x="3969784" y="182334"/>
+              <a:ext cx="1331800" cy="1226773"/>
+            </a:xfrm>
+            <a:prstGeom prst="ellipse">
+              <a:avLst/>
+            </a:prstGeom>
+          </p:spPr>
+          <p:style>
+            <a:lnRef idx="2">
+              <a:schemeClr val="dk1"/>
+            </a:lnRef>
+            <a:fillRef idx="1">
+              <a:schemeClr val="lt1"/>
+            </a:fillRef>
+            <a:effectRef idx="0">
+              <a:schemeClr val="dk1"/>
+            </a:effectRef>
+            <a:fontRef idx="minor">
+              <a:schemeClr val="dk1"/>
+            </a:fontRef>
+          </p:style>
+          <p:txBody>
+            <a:bodyPr rtlCol="0" anchor="ctr"/>
+            <a:lstStyle/>
+            <a:p>
+              <a:pPr algn="ctr"/>
+              <a:endParaRPr lang="en-US" dirty="0"/>
+            </a:p>
+          </p:txBody>
+        </p:sp>
+        <p:sp>
+          <p:nvSpPr>
+            <p:cNvPr id="52" name="TextBox 51"/>
+            <p:cNvSpPr txBox="1"/>
+            <p:nvPr/>
+          </p:nvSpPr>
+          <p:spPr>
+            <a:xfrm>
+              <a:off x="4006072" y="470358"/>
+              <a:ext cx="1212607" cy="415499"/>
+            </a:xfrm>
+            <a:prstGeom prst="rect">
+              <a:avLst/>
+            </a:prstGeom>
+            <a:noFill/>
+          </p:spPr>
+          <p:txBody>
+            <a:bodyPr wrap="square" rtlCol="0">
+              <a:spAutoFit/>
+            </a:bodyPr>
+            <a:lstStyle/>
+            <a:p>
+              <a:pPr algn="ctr"/>
+              <a:r>
+                <a:rPr lang="en-US" sz="4800" dirty="0"/>
+                <a:t> </a:t>
+              </a:r>
+              <a:r>
+                <a:rPr lang="en-US" sz="4800" dirty="0">
+                  <a:latin typeface="Times New Roman"/>
+                  <a:cs typeface="Times New Roman"/>
+                </a:rPr>
+                <a:t>Friction</a:t>
+              </a:r>
+              <a:endParaRPr lang="en-US" dirty="0">
+                <a:latin typeface="Times New Roman"/>
+                <a:cs typeface="Times New Roman"/>
+              </a:endParaRPr>
+            </a:p>
+          </p:txBody>
+        </p:sp>
+      </p:grpSp>
+      <p:grpSp>
+        <p:nvGrpSpPr>
+          <p:cNvPr id="53" name="Group 52"/>
+          <p:cNvGrpSpPr/>
+          <p:nvPr/>
+        </p:nvGrpSpPr>
+        <p:grpSpPr>
+          <a:xfrm>
+            <a:off x="7768754" y="4873132"/>
+            <a:ext cx="2663600" cy="2453546"/>
+            <a:chOff x="3969784" y="182334"/>
+            <a:chExt cx="1331800" cy="1226773"/>
+          </a:xfrm>
+        </p:grpSpPr>
+        <p:sp>
+          <p:nvSpPr>
+            <p:cNvPr id="54" name="Oval 53"/>
+            <p:cNvSpPr/>
+            <p:nvPr/>
+          </p:nvSpPr>
+          <p:spPr>
+            <a:xfrm>
+              <a:off x="3969784" y="182334"/>
+              <a:ext cx="1331800" cy="1226773"/>
+            </a:xfrm>
+            <a:prstGeom prst="ellipse">
+              <a:avLst/>
+            </a:prstGeom>
+          </p:spPr>
+          <p:style>
+            <a:lnRef idx="2">
+              <a:schemeClr val="dk1"/>
+            </a:lnRef>
+            <a:fillRef idx="1">
+              <a:schemeClr val="lt1"/>
+            </a:fillRef>
+            <a:effectRef idx="0">
+              <a:schemeClr val="dk1"/>
+            </a:effectRef>
+            <a:fontRef idx="minor">
+              <a:schemeClr val="dk1"/>
+            </a:fontRef>
+          </p:style>
+          <p:txBody>
+            <a:bodyPr rtlCol="0" anchor="ctr"/>
+            <a:lstStyle/>
+            <a:p>
+              <a:pPr algn="ctr"/>
+              <a:endParaRPr lang="en-US" dirty="0"/>
+            </a:p>
+          </p:txBody>
+        </p:sp>
+        <p:sp>
+          <p:nvSpPr>
+            <p:cNvPr id="55" name="TextBox 54"/>
+            <p:cNvSpPr txBox="1"/>
+            <p:nvPr/>
+          </p:nvSpPr>
+          <p:spPr>
+            <a:xfrm>
+              <a:off x="3997645" y="470358"/>
+              <a:ext cx="1217184" cy="415499"/>
+            </a:xfrm>
+            <a:prstGeom prst="rect">
+              <a:avLst/>
+            </a:prstGeom>
+            <a:noFill/>
+          </p:spPr>
+          <p:txBody>
+            <a:bodyPr wrap="square" rtlCol="0">
+              <a:spAutoFit/>
+            </a:bodyPr>
+            <a:lstStyle/>
+            <a:p>
+              <a:pPr algn="ctr"/>
+              <a:r>
+                <a:rPr lang="en-US" sz="4800" dirty="0"/>
+                <a:t> </a:t>
+              </a:r>
+              <a:r>
+                <a:rPr lang="en-US" sz="4800" dirty="0" err="1">
+                  <a:latin typeface="Times New Roman"/>
+                  <a:cs typeface="Times New Roman"/>
+                </a:rPr>
+                <a:t>Normals</a:t>
+              </a:r>
+              <a:endParaRPr lang="en-US" dirty="0">
+                <a:latin typeface="Times New Roman"/>
+                <a:cs typeface="Times New Roman"/>
+              </a:endParaRPr>
+            </a:p>
+          </p:txBody>
+        </p:sp>
+      </p:grpSp>
+      <p:sp>
+        <p:nvSpPr>
+          <p:cNvPr id="57" name="Oval 56"/>
+          <p:cNvSpPr/>
+          <p:nvPr/>
+        </p:nvSpPr>
+        <p:spPr>
+          <a:xfrm>
+            <a:off x="3090420" y="1023147"/>
+            <a:ext cx="2663600" cy="2453546"/>
+          </a:xfrm>
+          <a:prstGeom prst="ellipse">
+            <a:avLst/>
+          </a:prstGeom>
+          <a:solidFill>
+            <a:schemeClr val="bg1">
+              <a:lumMod val="75000"/>
+            </a:schemeClr>
+          </a:solidFill>
+        </p:spPr>
+        <p:style>
+          <a:lnRef idx="2">
+            <a:schemeClr val="dk1"/>
+          </a:lnRef>
+          <a:fillRef idx="1">
+            <a:schemeClr val="lt1"/>
+          </a:fillRef>
+          <a:effectRef idx="0">
+            <a:schemeClr val="dk1"/>
+          </a:effectRef>
+          <a:fontRef idx="minor">
+            <a:schemeClr val="dk1"/>
+          </a:fontRef>
+        </p:style>
+        <p:txBody>
+          <a:bodyPr lIns="91440" tIns="45720" rIns="91440" bIns="45720" rtlCol="0" anchor="ctr"/>
+          <a:lstStyle/>
+          <a:p>
+            <a:pPr algn="ctr"/>
+            <a:endParaRPr lang="en-US" dirty="0"/>
+          </a:p>
+        </p:txBody>
+      </p:sp>
+      <p:sp>
+        <p:nvSpPr>
+          <p:cNvPr id="58" name="TextBox 57"/>
+          <p:cNvSpPr txBox="1"/>
+          <p:nvPr/>
+        </p:nvSpPr>
+        <p:spPr>
+          <a:xfrm>
+            <a:off x="3366274" y="1599195"/>
+            <a:ext cx="2039736" cy="830998"/>
+          </a:xfrm>
+          <a:prstGeom prst="rect">
+            <a:avLst/>
+          </a:prstGeom>
+          <a:noFill/>
+        </p:spPr>
+        <p:txBody>
+          <a:bodyPr wrap="square" lIns="91440" tIns="45720" rIns="91440" bIns="45720" rtlCol="0">
+            <a:spAutoFit/>
+          </a:bodyPr>
+          <a:lstStyle/>
+          <a:p>
+            <a:pPr algn="ctr"/>
+            <a:r>
+              <a:rPr lang="en-US" sz="4800" dirty="0"/>
+              <a:t> </a:t>
+            </a:r>
+            <a:r>
+              <a:rPr lang="en-US" sz="4800" dirty="0">
+                <a:latin typeface="Times New Roman"/>
+                <a:cs typeface="Times New Roman"/>
+              </a:rPr>
+              <a:t>Pose</a:t>
+            </a:r>
+            <a:endParaRPr lang="en-US" dirty="0">
+              <a:latin typeface="Times New Roman"/>
+              <a:cs typeface="Times New Roman"/>
+            </a:endParaRPr>
+          </a:p>
+        </p:txBody>
+      </p:sp>
+      <p:grpSp>
+        <p:nvGrpSpPr>
+          <p:cNvPr id="59" name="Group 58"/>
+          <p:cNvGrpSpPr/>
+          <p:nvPr/>
+        </p:nvGrpSpPr>
+        <p:grpSpPr>
+          <a:xfrm>
+            <a:off x="7477360" y="8514113"/>
+            <a:ext cx="3097528" cy="2453546"/>
+            <a:chOff x="3828664" y="182334"/>
+            <a:chExt cx="1548764" cy="1226773"/>
+          </a:xfrm>
+        </p:grpSpPr>
+        <p:sp>
+          <p:nvSpPr>
+            <p:cNvPr id="60" name="Oval 59"/>
+            <p:cNvSpPr/>
+            <p:nvPr/>
+          </p:nvSpPr>
+          <p:spPr>
+            <a:xfrm>
+              <a:off x="3969784" y="182334"/>
+              <a:ext cx="1331800" cy="1226773"/>
+            </a:xfrm>
+            <a:prstGeom prst="ellipse">
+              <a:avLst/>
+            </a:prstGeom>
+            <a:ln w="177800" cmpd="sng"/>
+          </p:spPr>
+          <p:style>
+            <a:lnRef idx="2">
+              <a:schemeClr val="dk1"/>
+            </a:lnRef>
+            <a:fillRef idx="1">
+              <a:schemeClr val="lt1"/>
+            </a:fillRef>
+            <a:effectRef idx="0">
+              <a:schemeClr val="dk1"/>
+            </a:effectRef>
+            <a:fontRef idx="minor">
+              <a:schemeClr val="dk1"/>
+            </a:fontRef>
+          </p:style>
+          <p:txBody>
+            <a:bodyPr rtlCol="0" anchor="ctr"/>
+            <a:lstStyle/>
+            <a:p>
+              <a:pPr algn="ctr"/>
+              <a:endParaRPr lang="en-US" dirty="0"/>
+            </a:p>
+          </p:txBody>
+        </p:sp>
+        <p:sp>
+          <p:nvSpPr>
+            <p:cNvPr id="61" name="TextBox 60"/>
+            <p:cNvSpPr txBox="1"/>
+            <p:nvPr/>
+          </p:nvSpPr>
+          <p:spPr>
+            <a:xfrm>
+              <a:off x="3828664" y="452717"/>
+              <a:ext cx="1548764" cy="415499"/>
+            </a:xfrm>
+            <a:prstGeom prst="rect">
+              <a:avLst/>
+            </a:prstGeom>
+            <a:noFill/>
+          </p:spPr>
+          <p:txBody>
+            <a:bodyPr wrap="square" rtlCol="0">
+              <a:spAutoFit/>
+            </a:bodyPr>
+            <a:lstStyle/>
+            <a:p>
+              <a:pPr algn="ctr"/>
+              <a:r>
+                <a:rPr lang="en-US" sz="4800" dirty="0"/>
+                <a:t> </a:t>
+              </a:r>
+              <a:r>
+                <a:rPr lang="en-US" sz="4800" dirty="0">
+                  <a:latin typeface="Times New Roman"/>
+                  <a:cs typeface="Times New Roman"/>
+                </a:rPr>
+                <a:t>Quality</a:t>
+              </a:r>
+              <a:endParaRPr lang="en-US" dirty="0">
+                <a:latin typeface="Times New Roman"/>
+                <a:cs typeface="Times New Roman"/>
+              </a:endParaRPr>
+            </a:p>
+          </p:txBody>
+        </p:sp>
+      </p:grpSp>
+      <p:cxnSp>
+        <p:nvCxnSpPr>
+          <p:cNvPr id="4" name="Straight Arrow Connector 3"/>
+          <p:cNvCxnSpPr>
+            <a:stCxn id="57" idx="4"/>
+            <a:endCxn id="44" idx="0"/>
+          </p:cNvCxnSpPr>
+          <p:nvPr/>
+        </p:nvCxnSpPr>
+        <p:spPr>
+          <a:xfrm>
+            <a:off x="4422221" y="3476690"/>
+            <a:ext cx="8058" cy="1396440"/>
+          </a:xfrm>
+          <a:prstGeom prst="straightConnector1">
+            <a:avLst/>
+          </a:prstGeom>
+          <a:ln w="88900">
+            <a:solidFill>
+              <a:schemeClr val="tx1"/>
+            </a:solidFill>
+            <a:tailEnd type="triangle" w="med" len="med"/>
+          </a:ln>
+          <a:effectLst/>
+        </p:spPr>
+        <p:style>
+          <a:lnRef idx="2">
+            <a:schemeClr val="accent1"/>
+          </a:lnRef>
+          <a:fillRef idx="0">
+            <a:schemeClr val="accent1"/>
+          </a:fillRef>
+          <a:effectRef idx="1">
+            <a:schemeClr val="accent1"/>
+          </a:effectRef>
+          <a:fontRef idx="minor">
+            <a:schemeClr val="tx1"/>
+          </a:fontRef>
+        </p:style>
+      </p:cxnSp>
+      <p:cxnSp>
+        <p:nvCxnSpPr>
+          <p:cNvPr id="63" name="Straight Arrow Connector 62"/>
+          <p:cNvCxnSpPr>
+            <a:stCxn id="48" idx="3"/>
+            <a:endCxn id="44" idx="7"/>
+          </p:cNvCxnSpPr>
+          <p:nvPr/>
+        </p:nvCxnSpPr>
+        <p:spPr>
+          <a:xfrm flipH="1">
+            <a:off x="5372005" y="3117379"/>
+            <a:ext cx="2816822" cy="2115066"/>
+          </a:xfrm>
+          <a:prstGeom prst="straightConnector1">
+            <a:avLst/>
+          </a:prstGeom>
+          <a:ln w="88900">
+            <a:solidFill>
+              <a:schemeClr val="tx1"/>
+            </a:solidFill>
+            <a:tailEnd type="triangle" w="med" len="med"/>
+          </a:ln>
+          <a:effectLst/>
+        </p:spPr>
+        <p:style>
+          <a:lnRef idx="2">
+            <a:schemeClr val="accent1"/>
+          </a:lnRef>
+          <a:fillRef idx="0">
+            <a:schemeClr val="accent1"/>
+          </a:fillRef>
+          <a:effectRef idx="1">
+            <a:schemeClr val="accent1"/>
+          </a:effectRef>
+          <a:fontRef idx="minor">
+            <a:schemeClr val="tx1"/>
+          </a:fontRef>
+        </p:style>
+      </p:cxnSp>
+      <p:cxnSp>
+        <p:nvCxnSpPr>
+          <p:cNvPr id="65" name="Straight Arrow Connector 64"/>
+          <p:cNvCxnSpPr>
+            <a:stCxn id="44" idx="6"/>
+            <a:endCxn id="54" idx="2"/>
+          </p:cNvCxnSpPr>
+          <p:nvPr/>
+        </p:nvCxnSpPr>
+        <p:spPr>
+          <a:xfrm>
+            <a:off x="5762078" y="6099904"/>
+            <a:ext cx="2006676" cy="0"/>
+          </a:xfrm>
+          <a:prstGeom prst="straightConnector1">
+            <a:avLst/>
+          </a:prstGeom>
+          <a:ln w="88900">
+            <a:solidFill>
+              <a:schemeClr val="tx1"/>
+            </a:solidFill>
+            <a:tailEnd type="triangle" w="med" len="med"/>
+          </a:ln>
+          <a:effectLst/>
+        </p:spPr>
+        <p:style>
+          <a:lnRef idx="2">
+            <a:schemeClr val="accent1"/>
+          </a:lnRef>
+          <a:fillRef idx="0">
+            <a:schemeClr val="accent1"/>
+          </a:fillRef>
+          <a:effectRef idx="1">
+            <a:schemeClr val="accent1"/>
+          </a:effectRef>
+          <a:fontRef idx="minor">
+            <a:schemeClr val="tx1"/>
+          </a:fontRef>
+        </p:style>
+      </p:cxnSp>
+      <p:cxnSp>
+        <p:nvCxnSpPr>
+          <p:cNvPr id="72" name="Straight Arrow Connector 71"/>
+          <p:cNvCxnSpPr>
+            <a:stCxn id="44" idx="5"/>
+            <a:endCxn id="60" idx="1"/>
+          </p:cNvCxnSpPr>
+          <p:nvPr/>
+        </p:nvCxnSpPr>
+        <p:spPr>
+          <a:xfrm>
+            <a:off x="5372004" y="6967364"/>
+            <a:ext cx="2777672" cy="1906060"/>
+          </a:xfrm>
+          <a:prstGeom prst="straightConnector1">
+            <a:avLst/>
+          </a:prstGeom>
+          <a:ln w="88900">
+            <a:solidFill>
+              <a:schemeClr val="tx1"/>
+            </a:solidFill>
+            <a:tailEnd type="triangle" w="med" len="med"/>
+          </a:ln>
+          <a:effectLst/>
+        </p:spPr>
+        <p:style>
+          <a:lnRef idx="2">
+            <a:schemeClr val="accent1"/>
+          </a:lnRef>
+          <a:fillRef idx="0">
+            <a:schemeClr val="accent1"/>
+          </a:fillRef>
+          <a:effectRef idx="1">
+            <a:schemeClr val="accent1"/>
+          </a:effectRef>
+          <a:fontRef idx="minor">
+            <a:schemeClr val="tx1"/>
+          </a:fontRef>
+        </p:style>
+      </p:cxnSp>
+      <p:cxnSp>
+        <p:nvCxnSpPr>
+          <p:cNvPr id="75" name="Straight Arrow Connector 74"/>
+          <p:cNvCxnSpPr>
+            <a:stCxn id="54" idx="4"/>
+            <a:endCxn id="60" idx="0"/>
+          </p:cNvCxnSpPr>
+          <p:nvPr/>
+        </p:nvCxnSpPr>
+        <p:spPr>
+          <a:xfrm flipH="1">
+            <a:off x="9091401" y="7326679"/>
+            <a:ext cx="9154" cy="1187434"/>
+          </a:xfrm>
+          <a:prstGeom prst="straightConnector1">
+            <a:avLst/>
+          </a:prstGeom>
+          <a:ln w="88900">
+            <a:solidFill>
+              <a:schemeClr val="tx1"/>
+            </a:solidFill>
+            <a:tailEnd type="triangle" w="med" len="med"/>
+          </a:ln>
+          <a:effectLst/>
+        </p:spPr>
+        <p:style>
+          <a:lnRef idx="2">
+            <a:schemeClr val="accent1"/>
+          </a:lnRef>
+          <a:fillRef idx="0">
+            <a:schemeClr val="accent1"/>
+          </a:fillRef>
+          <a:effectRef idx="1">
+            <a:schemeClr val="accent1"/>
+          </a:effectRef>
+          <a:fontRef idx="minor">
+            <a:schemeClr val="tx1"/>
+          </a:fontRef>
+        </p:style>
+      </p:cxnSp>
+      <p:cxnSp>
+        <p:nvCxnSpPr>
+          <p:cNvPr id="78" name="Straight Arrow Connector 77"/>
+          <p:cNvCxnSpPr>
+            <a:stCxn id="51" idx="3"/>
+            <a:endCxn id="60" idx="7"/>
+          </p:cNvCxnSpPr>
+          <p:nvPr/>
+        </p:nvCxnSpPr>
+        <p:spPr>
+          <a:xfrm flipH="1">
+            <a:off x="10033126" y="6967364"/>
+            <a:ext cx="2499736" cy="1906060"/>
+          </a:xfrm>
+          <a:prstGeom prst="straightConnector1">
+            <a:avLst/>
+          </a:prstGeom>
+          <a:ln w="88900">
+            <a:solidFill>
+              <a:schemeClr val="tx1"/>
+            </a:solidFill>
+            <a:tailEnd type="triangle" w="med" len="med"/>
+          </a:ln>
+          <a:effectLst/>
+        </p:spPr>
+        <p:style>
+          <a:lnRef idx="2">
+            <a:schemeClr val="accent1"/>
+          </a:lnRef>
+          <a:fillRef idx="0">
+            <a:schemeClr val="accent1"/>
+          </a:fillRef>
+          <a:effectRef idx="1">
+            <a:schemeClr val="accent1"/>
+          </a:effectRef>
+          <a:fontRef idx="minor">
+            <a:schemeClr val="tx1"/>
+          </a:fontRef>
+        </p:style>
+      </p:cxnSp>
+      <p:pic>
+        <p:nvPicPr>
+          <p:cNvPr id="84" name="Picture 83"/>
+          <p:cNvPicPr>
+            <a:picLocks noChangeAspect="1"/>
+          </p:cNvPicPr>
+          <p:nvPr/>
+        </p:nvPicPr>
+        <p:blipFill>
+          <a:blip r:embed="rId2"/>
+          <a:stretch>
+            <a:fillRect/>
+          </a:stretch>
+        </p:blipFill>
+        <p:spPr>
+          <a:xfrm>
+            <a:off x="8685065" y="9978206"/>
+            <a:ext cx="856586" cy="603504"/>
+          </a:xfrm>
+          <a:prstGeom prst="rect">
+            <a:avLst/>
+          </a:prstGeom>
+        </p:spPr>
+      </p:pic>
+      <p:pic>
+        <p:nvPicPr>
+          <p:cNvPr id="3" name="Picture 2"/>
+          <p:cNvPicPr>
+            <a:picLocks noChangeAspect="1"/>
+          </p:cNvPicPr>
+          <p:nvPr/>
+        </p:nvPicPr>
+        <p:blipFill>
+          <a:blip r:embed="rId3">
+            <a:clrChange>
+              <a:clrFrom>
+                <a:srgbClr val="E2E2E2"/>
+              </a:clrFrom>
+              <a:clrTo>
+                <a:srgbClr val="E2E2E2">
+                  <a:alpha val="0"/>
+                </a:srgbClr>
+              </a:clrTo>
+            </a:clrChange>
+          </a:blip>
+          <a:stretch>
+            <a:fillRect/>
+          </a:stretch>
+        </p:blipFill>
+        <p:spPr>
+          <a:xfrm>
+            <a:off x="4262616" y="2499154"/>
+            <a:ext cx="319208" cy="658368"/>
+          </a:xfrm>
+          <a:prstGeom prst="rect">
+            <a:avLst/>
+          </a:prstGeom>
+        </p:spPr>
+      </p:pic>
+      <p:pic>
+        <p:nvPicPr>
+          <p:cNvPr id="5" name="Picture 4"/>
+          <p:cNvPicPr>
+            <a:picLocks noChangeAspect="1"/>
+          </p:cNvPicPr>
+          <p:nvPr/>
+        </p:nvPicPr>
+        <p:blipFill>
+          <a:blip r:embed="rId4"/>
+          <a:stretch>
+            <a:fillRect/>
+          </a:stretch>
+        </p:blipFill>
+        <p:spPr>
+          <a:xfrm>
+            <a:off x="8871954" y="2522522"/>
+            <a:ext cx="457200" cy="635000"/>
+          </a:xfrm>
+          <a:prstGeom prst="rect">
+            <a:avLst/>
+          </a:prstGeom>
+        </p:spPr>
+      </p:pic>
+      <p:pic>
+        <p:nvPicPr>
+          <p:cNvPr id="7" name="Picture 6"/>
+          <p:cNvPicPr>
+            <a:picLocks noChangeAspect="1"/>
+          </p:cNvPicPr>
+          <p:nvPr/>
+        </p:nvPicPr>
+        <p:blipFill>
+          <a:blip r:embed="rId5"/>
+          <a:stretch>
+            <a:fillRect/>
+          </a:stretch>
+        </p:blipFill>
+        <p:spPr>
+          <a:xfrm>
+            <a:off x="4195642" y="6461320"/>
+            <a:ext cx="431800" cy="431800"/>
+          </a:xfrm>
+          <a:prstGeom prst="rect">
+            <a:avLst/>
+          </a:prstGeom>
+        </p:spPr>
+      </p:pic>
+      <p:pic>
+        <p:nvPicPr>
+          <p:cNvPr id="8" name="Picture 7"/>
+          <p:cNvPicPr>
+            <a:picLocks noChangeAspect="1"/>
+          </p:cNvPicPr>
+          <p:nvPr/>
+        </p:nvPicPr>
+        <p:blipFill>
+          <a:blip r:embed="rId6"/>
+          <a:stretch>
+            <a:fillRect/>
+          </a:stretch>
+        </p:blipFill>
+        <p:spPr>
+          <a:xfrm>
+            <a:off x="8872050" y="6417708"/>
+            <a:ext cx="533400" cy="431800"/>
+          </a:xfrm>
+          <a:prstGeom prst="rect">
+            <a:avLst/>
+          </a:prstGeom>
+        </p:spPr>
+      </p:pic>
+      <p:pic>
+        <p:nvPicPr>
+          <p:cNvPr id="9" name="Picture 8"/>
+          <p:cNvPicPr>
+            <a:picLocks noChangeAspect="1"/>
+          </p:cNvPicPr>
+          <p:nvPr/>
+        </p:nvPicPr>
+        <p:blipFill>
+          <a:blip r:embed="rId7"/>
+          <a:stretch>
+            <a:fillRect/>
+          </a:stretch>
+        </p:blipFill>
+        <p:spPr>
+          <a:xfrm>
+            <a:off x="13247084" y="6332364"/>
+            <a:ext cx="508000" cy="635000"/>
+          </a:xfrm>
+          <a:prstGeom prst="rect">
+            <a:avLst/>
+          </a:prstGeom>
+        </p:spPr>
+      </p:pic>
+    </p:spTree>
+    <p:extLst>
+      <p:ext uri="{BB962C8B-B14F-4D97-AF65-F5344CB8AC3E}">
+        <p14:creationId xmlns:p14="http://schemas.microsoft.com/office/powerpoint/2010/main" val="2274606650"/>
+      </p:ext>
+    </p:extLst>
+  </p:cSld>
+  <p:clrMapOvr>
+    <a:masterClrMapping/>
+  </p:clrMapOvr>
+  <p:timing>
+    <p:tnLst>
+      <p:par>
+        <p:cTn xmlns:p14="http://schemas.microsoft.com/office/powerpoint/2010/main" id="1" dur="indefinite" restart="never" nodeType="tmRoot"/>
+      </p:par>
+    </p:tnLst>
+  </p:timing>
 </p:sld>
 </file>
 
@@ -3210,8 +4652,8 @@
         </p:blipFill>
         <p:spPr>
           <a:xfrm>
-            <a:off x="0" y="0"/>
-            <a:ext cx="12537649" cy="8856385"/>
+            <a:off x="3" y="3"/>
+            <a:ext cx="12537650" cy="8856386"/>
           </a:xfrm>
           <a:prstGeom prst="rect">
             <a:avLst/>
@@ -3240,8 +4682,8 @@
         </p:blipFill>
         <p:spPr>
           <a:xfrm>
-            <a:off x="6257982" y="904701"/>
-            <a:ext cx="17284815" cy="8114937"/>
+            <a:off x="6257982" y="904705"/>
+            <a:ext cx="17284816" cy="8114938"/>
           </a:xfrm>
           <a:prstGeom prst="rect">
             <a:avLst/>
@@ -3300,8 +4742,8 @@
         </p:blipFill>
         <p:spPr>
           <a:xfrm>
-            <a:off x="1" y="1"/>
-            <a:ext cx="12569184" cy="9024887"/>
+            <a:off x="2" y="2"/>
+            <a:ext cx="12569184" cy="9024888"/>
           </a:xfrm>
           <a:prstGeom prst="rect">
             <a:avLst/>
@@ -3330,7 +4772,7 @@
         </p:blipFill>
         <p:spPr>
           <a:xfrm>
-            <a:off x="5964918" y="770642"/>
+            <a:off x="5964918" y="770645"/>
             <a:ext cx="17581544" cy="8254246"/>
           </a:xfrm>
           <a:prstGeom prst="rect">
@@ -3359,8 +4801,8 @@
         </p:blipFill>
         <p:spPr>
           <a:xfrm>
-            <a:off x="1" y="0"/>
-            <a:ext cx="1107130" cy="8856385"/>
+            <a:off x="5" y="3"/>
+            <a:ext cx="1107130" cy="8856386"/>
           </a:xfrm>
           <a:prstGeom prst="rect">
             <a:avLst/>
@@ -3388,8 +4830,8 @@
         </p:blipFill>
         <p:spPr>
           <a:xfrm>
-            <a:off x="0" y="8433100"/>
-            <a:ext cx="12537649" cy="618645"/>
+            <a:off x="3" y="8433103"/>
+            <a:ext cx="12537650" cy="618646"/>
           </a:xfrm>
           <a:prstGeom prst="rect">
             <a:avLst/>
@@ -3448,7 +4890,7 @@
         </p:blipFill>
         <p:spPr>
           <a:xfrm>
-            <a:off x="5964918" y="770642"/>
+            <a:off x="5964918" y="770645"/>
             <a:ext cx="17581544" cy="8254246"/>
           </a:xfrm>
           <a:prstGeom prst="rect">
@@ -3478,8 +4920,8 @@
         </p:blipFill>
         <p:spPr>
           <a:xfrm>
-            <a:off x="342851" y="-1"/>
-            <a:ext cx="12547649" cy="9196425"/>
+            <a:off x="342853" y="-1"/>
+            <a:ext cx="12547650" cy="9196426"/>
           </a:xfrm>
           <a:prstGeom prst="rect">
             <a:avLst/>
@@ -3494,7 +4936,7 @@
         </p:nvSpPr>
         <p:spPr>
           <a:xfrm>
-            <a:off x="3619500" y="381000"/>
+            <a:off x="3619503" y="381000"/>
             <a:ext cx="6064250" cy="484892"/>
           </a:xfrm>
           <a:prstGeom prst="rect">
@@ -3525,7 +4967,7 @@
           </a:fontRef>
         </p:style>
         <p:txBody>
-          <a:bodyPr rtlCol="0" anchor="ctr"/>
+          <a:bodyPr lIns="91440" tIns="45720" rIns="91440" bIns="45720" spcCol="0" rtlCol="0" anchor="ctr"/>
           <a:lstStyle/>
           <a:p>
             <a:pPr algn="ctr"/>
@@ -3537,6 +4979,2245 @@
     <p:extLst>
       <p:ext uri="{BB962C8B-B14F-4D97-AF65-F5344CB8AC3E}">
         <p14:creationId xmlns:p14="http://schemas.microsoft.com/office/powerpoint/2010/main" val="32792867"/>
+      </p:ext>
+    </p:extLst>
+  </p:cSld>
+  <p:clrMapOvr>
+    <a:masterClrMapping/>
+  </p:clrMapOvr>
+</p:sld>
+</file>
+
+<file path=ppt/slides/slide5.xml><?xml version="1.0" encoding="utf-8"?>
+<p:sld xmlns:a="http://schemas.openxmlformats.org/drawingml/2006/main" xmlns:r="http://schemas.openxmlformats.org/officeDocument/2006/relationships" xmlns:p="http://schemas.openxmlformats.org/presentationml/2006/main">
+  <p:cSld>
+    <p:spTree>
+      <p:nvGrpSpPr>
+        <p:cNvPr id="1" name=""/>
+        <p:cNvGrpSpPr/>
+        <p:nvPr/>
+      </p:nvGrpSpPr>
+      <p:grpSpPr>
+        <a:xfrm>
+          <a:off x="0" y="0"/>
+          <a:ext cx="0" cy="0"/>
+          <a:chOff x="0" y="0"/>
+          <a:chExt cx="0" cy="0"/>
+        </a:xfrm>
+      </p:grpSpPr>
+      <p:pic>
+        <p:nvPicPr>
+          <p:cNvPr id="4" name="Picture 3" descr="BigBIRD_detergent_avg_reward.png"/>
+          <p:cNvPicPr>
+            <a:picLocks noChangeAspect="1"/>
+          </p:cNvPicPr>
+          <p:nvPr/>
+        </p:nvPicPr>
+        <p:blipFill>
+          <a:blip r:embed="rId2">
+            <a:extLst>
+              <a:ext uri="{28A0092B-C50C-407E-A947-70E740481C1C}">
+                <a14:useLocalDpi xmlns:a14="http://schemas.microsoft.com/office/drawing/2010/main" val="0"/>
+              </a:ext>
+            </a:extLst>
+          </a:blip>
+          <a:stretch>
+            <a:fillRect/>
+          </a:stretch>
+        </p:blipFill>
+        <p:spPr>
+          <a:xfrm>
+            <a:off x="623897" y="-44566"/>
+            <a:ext cx="12787303" cy="9163166"/>
+          </a:xfrm>
+          <a:prstGeom prst="rect">
+            <a:avLst/>
+          </a:prstGeom>
+        </p:spPr>
+      </p:pic>
+      <p:pic>
+        <p:nvPicPr>
+          <p:cNvPr id="6" name="Picture 5" descr="detergent07.png"/>
+          <p:cNvPicPr>
+            <a:picLocks noChangeAspect="1"/>
+          </p:cNvPicPr>
+          <p:nvPr/>
+        </p:nvPicPr>
+        <p:blipFill rotWithShape="1">
+          <a:blip r:embed="rId3">
+            <a:clrChange>
+              <a:clrFrom>
+                <a:srgbClr val="FFFFFF"/>
+              </a:clrFrom>
+              <a:clrTo>
+                <a:srgbClr val="FFFFFF">
+                  <a:alpha val="0"/>
+                </a:srgbClr>
+              </a:clrTo>
+            </a:clrChange>
+            <a:extLst>
+              <a:ext uri="{28A0092B-C50C-407E-A947-70E740481C1C}">
+                <a14:useLocalDpi xmlns:a14="http://schemas.microsoft.com/office/drawing/2010/main" val="0"/>
+              </a:ext>
+            </a:extLst>
+          </a:blip>
+          <a:srcRect l="29798" t="9120" r="32576" b="8708"/>
+          <a:stretch/>
+        </p:blipFill>
+        <p:spPr>
+          <a:xfrm>
+            <a:off x="12238180" y="410395"/>
+            <a:ext cx="5745020" cy="8120949"/>
+          </a:xfrm>
+          <a:prstGeom prst="rect">
+            <a:avLst/>
+          </a:prstGeom>
+        </p:spPr>
+      </p:pic>
+      <p:sp>
+        <p:nvSpPr>
+          <p:cNvPr id="7" name="Rectangle 6"/>
+          <p:cNvSpPr/>
+          <p:nvPr/>
+        </p:nvSpPr>
+        <p:spPr>
+          <a:xfrm>
+            <a:off x="3822703" y="330200"/>
+            <a:ext cx="6064250" cy="484892"/>
+          </a:xfrm>
+          <a:prstGeom prst="rect">
+            <a:avLst/>
+          </a:prstGeom>
+          <a:solidFill>
+            <a:schemeClr val="bg1"/>
+          </a:solidFill>
+          <a:ln>
+            <a:solidFill>
+              <a:schemeClr val="bg1"/>
+            </a:solidFill>
+          </a:ln>
+          <a:effectLst/>
+        </p:spPr>
+        <p:style>
+          <a:lnRef idx="1">
+            <a:schemeClr val="accent1"/>
+          </a:lnRef>
+          <a:fillRef idx="3">
+            <a:schemeClr val="accent1"/>
+          </a:fillRef>
+          <a:effectRef idx="2">
+            <a:schemeClr val="accent1"/>
+          </a:effectRef>
+          <a:fontRef idx="minor">
+            <a:schemeClr val="lt1"/>
+          </a:fontRef>
+        </p:style>
+        <p:txBody>
+          <a:bodyPr lIns="91440" tIns="45720" rIns="91440" bIns="45720" spcCol="0" rtlCol="0" anchor="ctr"/>
+          <a:lstStyle/>
+          <a:p>
+            <a:pPr algn="ctr"/>
+            <a:endParaRPr lang="en-US"/>
+          </a:p>
+        </p:txBody>
+      </p:sp>
+    </p:spTree>
+    <p:extLst>
+      <p:ext uri="{BB962C8B-B14F-4D97-AF65-F5344CB8AC3E}">
+        <p14:creationId xmlns:p14="http://schemas.microsoft.com/office/powerpoint/2010/main" val="1748405990"/>
+      </p:ext>
+    </p:extLst>
+  </p:cSld>
+  <p:clrMapOvr>
+    <a:masterClrMapping/>
+  </p:clrMapOvr>
+  <p:timing>
+    <p:tnLst>
+      <p:par>
+        <p:cTn xmlns:p14="http://schemas.microsoft.com/office/powerpoint/2010/main" id="1" dur="indefinite" restart="never" nodeType="tmRoot"/>
+      </p:par>
+    </p:tnLst>
+  </p:timing>
+</p:sld>
+</file>
+
+<file path=ppt/slides/slide6.xml><?xml version="1.0" encoding="utf-8"?>
+<p:sld xmlns:a="http://schemas.openxmlformats.org/drawingml/2006/main" xmlns:r="http://schemas.openxmlformats.org/officeDocument/2006/relationships" xmlns:p="http://schemas.openxmlformats.org/presentationml/2006/main">
+  <p:cSld>
+    <p:spTree>
+      <p:nvGrpSpPr>
+        <p:cNvPr id="1" name=""/>
+        <p:cNvGrpSpPr/>
+        <p:nvPr/>
+      </p:nvGrpSpPr>
+      <p:grpSpPr>
+        <a:xfrm>
+          <a:off x="0" y="0"/>
+          <a:ext cx="0" cy="0"/>
+          <a:chOff x="0" y="0"/>
+          <a:chExt cx="0" cy="0"/>
+        </a:xfrm>
+      </p:grpSpPr>
+      <p:pic>
+        <p:nvPicPr>
+          <p:cNvPr id="156" name="a429f8eb0c3e6a1e6ea2d79f658bbae7_color_0_0_0.jpg"/>
+          <p:cNvPicPr/>
+          <p:nvPr/>
+        </p:nvPicPr>
+        <p:blipFill>
+          <a:blip r:embed="rId2">
+            <a:extLst/>
+          </a:blip>
+          <a:srcRect t="35267" b="35267"/>
+          <a:stretch>
+            <a:fillRect/>
+          </a:stretch>
+        </p:blipFill>
+        <p:spPr>
+          <a:xfrm>
+            <a:off x="11450727" y="11349587"/>
+            <a:ext cx="4572001" cy="1347168"/>
+          </a:xfrm>
+          <a:prstGeom prst="rect">
+            <a:avLst/>
+          </a:prstGeom>
+          <a:ln w="12700">
+            <a:miter lim="400000"/>
+          </a:ln>
+        </p:spPr>
+      </p:pic>
+      <p:pic>
+        <p:nvPicPr>
+          <p:cNvPr id="157" name="CokePlasticSmall_800_tex_color_0_0_0.jpg"/>
+          <p:cNvPicPr/>
+          <p:nvPr/>
+        </p:nvPicPr>
+        <p:blipFill>
+          <a:blip r:embed="rId3">
+            <a:extLst/>
+          </a:blip>
+          <a:srcRect t="35094" b="35094"/>
+          <a:stretch>
+            <a:fillRect/>
+          </a:stretch>
+        </p:blipFill>
+        <p:spPr>
+          <a:xfrm>
+            <a:off x="11516955" y="2654531"/>
+            <a:ext cx="4572001" cy="1362935"/>
+          </a:xfrm>
+          <a:prstGeom prst="rect">
+            <a:avLst/>
+          </a:prstGeom>
+          <a:ln w="12700">
+            <a:miter lim="400000"/>
+          </a:ln>
+        </p:spPr>
+      </p:pic>
+      <p:pic>
+        <p:nvPicPr>
+          <p:cNvPr id="158" name="CokePlasticSmallGrasp_800_tex_color_0_0_0.jpg"/>
+          <p:cNvPicPr/>
+          <p:nvPr/>
+        </p:nvPicPr>
+        <p:blipFill>
+          <a:blip r:embed="rId4">
+            <a:extLst/>
+          </a:blip>
+          <a:srcRect t="38191" b="38191"/>
+          <a:stretch>
+            <a:fillRect/>
+          </a:stretch>
+        </p:blipFill>
+        <p:spPr>
+          <a:xfrm>
+            <a:off x="11516955" y="5169023"/>
+            <a:ext cx="4572001" cy="1079792"/>
+          </a:xfrm>
+          <a:prstGeom prst="rect">
+            <a:avLst/>
+          </a:prstGeom>
+          <a:ln w="12700">
+            <a:miter lim="400000"/>
+          </a:ln>
+        </p:spPr>
+      </p:pic>
+      <p:pic>
+        <p:nvPicPr>
+          <p:cNvPr id="159" name="ketchup_bottle_color_0_0_0.jpg"/>
+          <p:cNvPicPr/>
+          <p:nvPr/>
+        </p:nvPicPr>
+        <p:blipFill>
+          <a:blip r:embed="rId5">
+            <a:extLst/>
+          </a:blip>
+          <a:srcRect t="36358" b="36358"/>
+          <a:stretch>
+            <a:fillRect/>
+          </a:stretch>
+        </p:blipFill>
+        <p:spPr>
+          <a:xfrm>
+            <a:off x="11415626" y="7397212"/>
+            <a:ext cx="4572001" cy="1247347"/>
+          </a:xfrm>
+          <a:prstGeom prst="rect">
+            <a:avLst/>
+          </a:prstGeom>
+          <a:ln w="12700">
+            <a:miter lim="400000"/>
+          </a:ln>
+        </p:spPr>
+      </p:pic>
+      <p:pic>
+        <p:nvPicPr>
+          <p:cNvPr id="160" name="HygieneSpray_800_tex_color_0_0_0.jpg"/>
+          <p:cNvPicPr/>
+          <p:nvPr/>
+        </p:nvPicPr>
+        <p:blipFill>
+          <a:blip r:embed="rId6">
+            <a:extLst/>
+          </a:blip>
+          <a:srcRect t="34593" b="34593"/>
+          <a:stretch>
+            <a:fillRect/>
+          </a:stretch>
+        </p:blipFill>
+        <p:spPr>
+          <a:xfrm>
+            <a:off x="11552056" y="9396492"/>
+            <a:ext cx="4572001" cy="1408732"/>
+          </a:xfrm>
+          <a:prstGeom prst="rect">
+            <a:avLst/>
+          </a:prstGeom>
+          <a:ln w="12700">
+            <a:miter lim="400000"/>
+          </a:ln>
+        </p:spPr>
+      </p:pic>
+      <p:pic>
+        <p:nvPicPr>
+          <p:cNvPr id="161" name="6623907ab044311af4bdca145ed48dc6_color_0_0_0.jpg"/>
+          <p:cNvPicPr/>
+          <p:nvPr/>
+        </p:nvPicPr>
+        <p:blipFill>
+          <a:blip r:embed="rId7">
+            <a:extLst/>
+          </a:blip>
+          <a:srcRect t="33593" b="33593"/>
+          <a:stretch>
+            <a:fillRect/>
+          </a:stretch>
+        </p:blipFill>
+        <p:spPr>
+          <a:xfrm>
+            <a:off x="7761555" y="2609539"/>
+            <a:ext cx="4572001" cy="1500189"/>
+          </a:xfrm>
+          <a:prstGeom prst="rect">
+            <a:avLst/>
+          </a:prstGeom>
+          <a:ln w="12700">
+            <a:miter lim="400000"/>
+          </a:ln>
+        </p:spPr>
+      </p:pic>
+      <p:pic>
+        <p:nvPicPr>
+          <p:cNvPr id="162" name="f452c1053f88cd2fc21f7907838a35d1_color_0_0_0.jpg"/>
+          <p:cNvPicPr/>
+          <p:nvPr/>
+        </p:nvPicPr>
+        <p:blipFill>
+          <a:blip r:embed="rId8">
+            <a:extLst/>
+          </a:blip>
+          <a:srcRect t="35798" b="35798"/>
+          <a:stretch>
+            <a:fillRect/>
+          </a:stretch>
+        </p:blipFill>
+        <p:spPr>
+          <a:xfrm flipH="1">
+            <a:off x="7761555" y="5083281"/>
+            <a:ext cx="4572001" cy="1298628"/>
+          </a:xfrm>
+          <a:prstGeom prst="rect">
+            <a:avLst/>
+          </a:prstGeom>
+          <a:ln w="12700">
+            <a:miter lim="400000"/>
+          </a:ln>
+        </p:spPr>
+      </p:pic>
+      <p:pic>
+        <p:nvPicPr>
+          <p:cNvPr id="163" name="114509277e76e413c8724d5673a063a6_color_0_0_0.jpg"/>
+          <p:cNvPicPr/>
+          <p:nvPr/>
+        </p:nvPicPr>
+        <p:blipFill>
+          <a:blip r:embed="rId9">
+            <a:extLst/>
+          </a:blip>
+          <a:srcRect t="38830" b="38830"/>
+          <a:stretch>
+            <a:fillRect/>
+          </a:stretch>
+        </p:blipFill>
+        <p:spPr>
+          <a:xfrm flipH="1">
+            <a:off x="7660226" y="7559684"/>
+            <a:ext cx="4572001" cy="1021380"/>
+          </a:xfrm>
+          <a:prstGeom prst="rect">
+            <a:avLst/>
+          </a:prstGeom>
+          <a:ln w="12700">
+            <a:miter lim="400000"/>
+          </a:ln>
+        </p:spPr>
+      </p:pic>
+      <p:pic>
+        <p:nvPicPr>
+          <p:cNvPr id="164" name="e8b48d395d3d8744e53e6e0633163da8_color_0_0_0.jpg"/>
+          <p:cNvPicPr/>
+          <p:nvPr/>
+        </p:nvPicPr>
+        <p:blipFill>
+          <a:blip r:embed="rId10">
+            <a:extLst/>
+          </a:blip>
+          <a:srcRect t="36835" b="36835"/>
+          <a:stretch>
+            <a:fillRect/>
+          </a:stretch>
+        </p:blipFill>
+        <p:spPr>
+          <a:xfrm flipH="1">
+            <a:off x="7934116" y="9525448"/>
+            <a:ext cx="4572001" cy="1203744"/>
+          </a:xfrm>
+          <a:prstGeom prst="rect">
+            <a:avLst/>
+          </a:prstGeom>
+          <a:ln w="12700">
+            <a:miter lim="400000"/>
+          </a:ln>
+        </p:spPr>
+      </p:pic>
+      <p:pic>
+        <p:nvPicPr>
+          <p:cNvPr id="165" name="dacc6638cd62d82f42ebc0504c999b_color_0_0_0.jpg"/>
+          <p:cNvPicPr/>
+          <p:nvPr/>
+        </p:nvPicPr>
+        <p:blipFill>
+          <a:blip r:embed="rId11">
+            <a:extLst/>
+          </a:blip>
+          <a:srcRect t="33217" b="33217"/>
+          <a:stretch>
+            <a:fillRect/>
+          </a:stretch>
+        </p:blipFill>
+        <p:spPr>
+          <a:xfrm>
+            <a:off x="7695328" y="11279482"/>
+            <a:ext cx="4572001" cy="1534604"/>
+          </a:xfrm>
+          <a:prstGeom prst="rect">
+            <a:avLst/>
+          </a:prstGeom>
+          <a:ln w="12700">
+            <a:miter lim="400000"/>
+          </a:ln>
+        </p:spPr>
+      </p:pic>
+      <p:pic>
+        <p:nvPicPr>
+          <p:cNvPr id="166" name="ccca0685aa63308ed54e5c2e672a56dc_color_0_1_2.jpg"/>
+          <p:cNvPicPr/>
+          <p:nvPr/>
+        </p:nvPicPr>
+        <p:blipFill>
+          <a:blip r:embed="rId12">
+            <a:extLst/>
+          </a:blip>
+          <a:srcRect t="22240" b="28327"/>
+          <a:stretch>
+            <a:fillRect/>
+          </a:stretch>
+        </p:blipFill>
+        <p:spPr>
+          <a:xfrm>
+            <a:off x="3963192" y="2243637"/>
+            <a:ext cx="4572001" cy="2260017"/>
+          </a:xfrm>
+          <a:prstGeom prst="rect">
+            <a:avLst/>
+          </a:prstGeom>
+          <a:ln w="12700">
+            <a:miter lim="400000"/>
+          </a:ln>
+        </p:spPr>
+      </p:pic>
+      <p:pic>
+        <p:nvPicPr>
+          <p:cNvPr id="167" name="Waterglass_800_tex_color_0_0_0.jpg"/>
+          <p:cNvPicPr/>
+          <p:nvPr/>
+        </p:nvPicPr>
+        <p:blipFill>
+          <a:blip r:embed="rId13">
+            <a:extLst/>
+          </a:blip>
+          <a:srcRect t="30581" b="30581"/>
+          <a:stretch>
+            <a:fillRect/>
+          </a:stretch>
+        </p:blipFill>
+        <p:spPr>
+          <a:xfrm>
+            <a:off x="3963192" y="4887266"/>
+            <a:ext cx="4572001" cy="1775656"/>
+          </a:xfrm>
+          <a:prstGeom prst="rect">
+            <a:avLst/>
+          </a:prstGeom>
+          <a:ln w="12700">
+            <a:miter lim="400000"/>
+          </a:ln>
+        </p:spPr>
+      </p:pic>
+      <p:pic>
+        <p:nvPicPr>
+          <p:cNvPr id="168" name="d2428faf5fccfd4d84688264755620b0_color_0_0_0.jpg"/>
+          <p:cNvPicPr/>
+          <p:nvPr/>
+        </p:nvPicPr>
+        <p:blipFill>
+          <a:blip r:embed="rId14">
+            <a:extLst/>
+          </a:blip>
+          <a:srcRect t="34559" b="34559"/>
+          <a:stretch>
+            <a:fillRect/>
+          </a:stretch>
+        </p:blipFill>
+        <p:spPr>
+          <a:xfrm>
+            <a:off x="3861864" y="7386468"/>
+            <a:ext cx="4572001" cy="1411886"/>
+          </a:xfrm>
+          <a:prstGeom prst="rect">
+            <a:avLst/>
+          </a:prstGeom>
+          <a:ln w="12700">
+            <a:miter lim="400000"/>
+          </a:ln>
+        </p:spPr>
+      </p:pic>
+      <p:pic>
+        <p:nvPicPr>
+          <p:cNvPr id="169" name="c05e394275f31b2f919c75aa33ca3d5d_color_0_0_0.jpg"/>
+          <p:cNvPicPr/>
+          <p:nvPr/>
+        </p:nvPicPr>
+        <p:blipFill>
+          <a:blip r:embed="rId15">
+            <a:extLst/>
+          </a:blip>
+          <a:srcRect t="37221" b="37221"/>
+          <a:stretch>
+            <a:fillRect/>
+          </a:stretch>
+        </p:blipFill>
+        <p:spPr>
+          <a:xfrm>
+            <a:off x="3998294" y="9585605"/>
+            <a:ext cx="4572001" cy="1168505"/>
+          </a:xfrm>
+          <a:prstGeom prst="rect">
+            <a:avLst/>
+          </a:prstGeom>
+          <a:ln w="12700">
+            <a:miter lim="400000"/>
+          </a:ln>
+        </p:spPr>
+      </p:pic>
+      <p:pic>
+        <p:nvPicPr>
+          <p:cNvPr id="170" name="ShoeNike_color_0_4_0.jpg"/>
+          <p:cNvPicPr/>
+          <p:nvPr/>
+        </p:nvPicPr>
+        <p:blipFill>
+          <a:blip r:embed="rId16">
+            <a:extLst/>
+          </a:blip>
+          <a:srcRect t="33947" b="33947"/>
+          <a:stretch>
+            <a:fillRect/>
+          </a:stretch>
+        </p:blipFill>
+        <p:spPr>
+          <a:xfrm>
+            <a:off x="3896965" y="11326855"/>
+            <a:ext cx="4572001" cy="1467830"/>
+          </a:xfrm>
+          <a:prstGeom prst="rect">
+            <a:avLst/>
+          </a:prstGeom>
+          <a:ln w="12700">
+            <a:miter lim="400000"/>
+          </a:ln>
+        </p:spPr>
+      </p:pic>
+      <p:sp>
+        <p:nvSpPr>
+          <p:cNvPr id="171" name="Shape 171"/>
+          <p:cNvSpPr/>
+          <p:nvPr/>
+        </p:nvSpPr>
+        <p:spPr>
+          <a:xfrm>
+            <a:off x="5631876" y="1476001"/>
+            <a:ext cx="759818" cy="882929"/>
+          </a:xfrm>
+          <a:prstGeom prst="rect">
+            <a:avLst/>
+          </a:prstGeom>
+          <a:ln w="12700">
+            <a:miter lim="400000"/>
+          </a:ln>
+          <a:extLst>
+            <a:ext uri="{C572A759-6A51-4108-AA02-DFA0A04FC94B}">
+              <ma14:wrappingTextBoxFlag xmlns:ma14="http://schemas.microsoft.com/office/mac/drawingml/2011/main" val="1"/>
+            </a:ext>
+          </a:extLst>
+        </p:spPr>
+        <p:txBody>
+          <a:bodyPr wrap="none" lIns="71435" tIns="71435" rIns="71435" bIns="71435" anchor="ctr">
+            <a:spAutoFit/>
+          </a:bodyPr>
+          <a:lstStyle>
+            <a:lvl1pPr>
+              <a:defRPr sz="2400"/>
+            </a:lvl1pPr>
+          </a:lstStyle>
+          <a:p>
+            <a:pPr lvl="0">
+              <a:defRPr sz="1800"/>
+            </a:pPr>
+            <a:r>
+              <a:rPr sz="4800" b="1" dirty="0" smtClean="0">
+                <a:latin typeface="Times New Roman"/>
+                <a:cs typeface="Times New Roman"/>
+              </a:rPr>
+              <a:t>1</a:t>
+            </a:r>
+            <a:r>
+              <a:rPr lang="en-US" sz="4800" b="1" dirty="0" smtClean="0">
+                <a:latin typeface="Times New Roman"/>
+                <a:cs typeface="Times New Roman"/>
+              </a:rPr>
+              <a:t>5</a:t>
+            </a:r>
+            <a:endParaRPr sz="4800" b="1" dirty="0">
+              <a:latin typeface="Times New Roman"/>
+              <a:cs typeface="Times New Roman"/>
+            </a:endParaRPr>
+          </a:p>
+        </p:txBody>
+      </p:sp>
+      <p:sp>
+        <p:nvSpPr>
+          <p:cNvPr id="172" name="Shape 172"/>
+          <p:cNvSpPr/>
+          <p:nvPr/>
+        </p:nvSpPr>
+        <p:spPr>
+          <a:xfrm>
+            <a:off x="9637890" y="1543940"/>
+            <a:ext cx="1067595" cy="882929"/>
+          </a:xfrm>
+          <a:prstGeom prst="rect">
+            <a:avLst/>
+          </a:prstGeom>
+          <a:ln w="12700">
+            <a:miter lim="400000"/>
+          </a:ln>
+          <a:extLst>
+            <a:ext uri="{C572A759-6A51-4108-AA02-DFA0A04FC94B}">
+              <ma14:wrappingTextBoxFlag xmlns:ma14="http://schemas.microsoft.com/office/mac/drawingml/2011/main" val="1"/>
+            </a:ext>
+          </a:extLst>
+        </p:spPr>
+        <p:txBody>
+          <a:bodyPr wrap="none" lIns="71435" tIns="71435" rIns="71435" bIns="71435" anchor="ctr">
+            <a:spAutoFit/>
+          </a:bodyPr>
+          <a:lstStyle>
+            <a:lvl1pPr>
+              <a:defRPr sz="2400"/>
+            </a:lvl1pPr>
+          </a:lstStyle>
+          <a:p>
+            <a:pPr lvl="0">
+              <a:defRPr sz="1800"/>
+            </a:pPr>
+            <a:r>
+              <a:rPr sz="4800" b="1" dirty="0" smtClean="0">
+                <a:latin typeface="Times New Roman"/>
+                <a:cs typeface="Times New Roman"/>
+              </a:rPr>
+              <a:t>150</a:t>
+            </a:r>
+            <a:endParaRPr sz="4800" b="1" dirty="0">
+              <a:latin typeface="Times New Roman"/>
+              <a:cs typeface="Times New Roman"/>
+            </a:endParaRPr>
+          </a:p>
+        </p:txBody>
+      </p:sp>
+      <p:sp>
+        <p:nvSpPr>
+          <p:cNvPr id="173" name="Shape 173"/>
+          <p:cNvSpPr/>
+          <p:nvPr/>
+        </p:nvSpPr>
+        <p:spPr>
+          <a:xfrm>
+            <a:off x="12979710" y="1543940"/>
+            <a:ext cx="1529260" cy="882929"/>
+          </a:xfrm>
+          <a:prstGeom prst="rect">
+            <a:avLst/>
+          </a:prstGeom>
+          <a:ln w="12700">
+            <a:miter lim="400000"/>
+          </a:ln>
+          <a:extLst>
+            <a:ext uri="{C572A759-6A51-4108-AA02-DFA0A04FC94B}">
+              <ma14:wrappingTextBoxFlag xmlns:ma14="http://schemas.microsoft.com/office/mac/drawingml/2011/main" val="1"/>
+            </a:ext>
+          </a:extLst>
+        </p:spPr>
+        <p:txBody>
+          <a:bodyPr wrap="none" lIns="71435" tIns="71435" rIns="71435" bIns="71435" anchor="ctr">
+            <a:spAutoFit/>
+          </a:bodyPr>
+          <a:lstStyle>
+            <a:lvl1pPr>
+              <a:defRPr sz="2400"/>
+            </a:lvl1pPr>
+          </a:lstStyle>
+          <a:p>
+            <a:pPr lvl="0">
+              <a:defRPr sz="1800"/>
+            </a:pPr>
+            <a:r>
+              <a:rPr sz="4800" b="1" dirty="0" smtClean="0">
+                <a:latin typeface="Times New Roman"/>
+                <a:cs typeface="Times New Roman"/>
+              </a:rPr>
+              <a:t>1,500</a:t>
+            </a:r>
+            <a:endParaRPr sz="4800" b="1" dirty="0">
+              <a:latin typeface="Times New Roman"/>
+              <a:cs typeface="Times New Roman"/>
+            </a:endParaRPr>
+          </a:p>
+        </p:txBody>
+      </p:sp>
+      <p:sp>
+        <p:nvSpPr>
+          <p:cNvPr id="174" name="Shape 174"/>
+          <p:cNvSpPr/>
+          <p:nvPr/>
+        </p:nvSpPr>
+        <p:spPr>
+          <a:xfrm>
+            <a:off x="107110" y="5688366"/>
+            <a:ext cx="3751022" cy="882929"/>
+          </a:xfrm>
+          <a:prstGeom prst="rect">
+            <a:avLst/>
+          </a:prstGeom>
+          <a:ln w="12700">
+            <a:miter lim="400000"/>
+          </a:ln>
+          <a:extLst>
+            <a:ext uri="{C572A759-6A51-4108-AA02-DFA0A04FC94B}">
+              <ma14:wrappingTextBoxFlag xmlns:ma14="http://schemas.microsoft.com/office/mac/drawingml/2011/main" val="1"/>
+            </a:ext>
+          </a:extLst>
+        </p:spPr>
+        <p:txBody>
+          <a:bodyPr wrap="none" lIns="71435" tIns="71435" rIns="71435" bIns="71435" anchor="ctr">
+            <a:spAutoFit/>
+          </a:bodyPr>
+          <a:lstStyle>
+            <a:lvl1pPr>
+              <a:defRPr sz="2400"/>
+            </a:lvl1pPr>
+          </a:lstStyle>
+          <a:p>
+            <a:pPr lvl="0">
+              <a:defRPr sz="1800"/>
+            </a:pPr>
+            <a:r>
+              <a:rPr sz="4800" b="1" dirty="0">
+                <a:latin typeface="Times New Roman"/>
+                <a:cs typeface="Times New Roman"/>
+              </a:rPr>
+              <a:t>Query Object</a:t>
+            </a:r>
+          </a:p>
+        </p:txBody>
+      </p:sp>
+      <p:pic>
+        <p:nvPicPr>
+          <p:cNvPr id="175" name="MelforBottle_800_tex_color_0_0_0.jpg"/>
+          <p:cNvPicPr/>
+          <p:nvPr/>
+        </p:nvPicPr>
+        <p:blipFill>
+          <a:blip r:embed="rId17">
+            <a:extLst/>
+          </a:blip>
+          <a:srcRect t="36085" b="36085"/>
+          <a:stretch>
+            <a:fillRect/>
+          </a:stretch>
+        </p:blipFill>
+        <p:spPr>
+          <a:xfrm>
+            <a:off x="-573707" y="6923532"/>
+            <a:ext cx="4572001" cy="1272303"/>
+          </a:xfrm>
+          <a:prstGeom prst="rect">
+            <a:avLst/>
+          </a:prstGeom>
+          <a:ln w="12700">
+            <a:miter lim="400000"/>
+          </a:ln>
+        </p:spPr>
+      </p:pic>
+      <p:sp>
+        <p:nvSpPr>
+          <p:cNvPr id="176" name="Shape 176"/>
+          <p:cNvSpPr/>
+          <p:nvPr/>
+        </p:nvSpPr>
+        <p:spPr>
+          <a:xfrm>
+            <a:off x="5794809" y="307166"/>
+            <a:ext cx="8873417" cy="1129150"/>
+          </a:xfrm>
+          <a:prstGeom prst="rect">
+            <a:avLst/>
+          </a:prstGeom>
+          <a:ln w="12700">
+            <a:miter lim="400000"/>
+          </a:ln>
+          <a:extLst>
+            <a:ext uri="{C572A759-6A51-4108-AA02-DFA0A04FC94B}">
+              <ma14:wrappingTextBoxFlag xmlns:ma14="http://schemas.microsoft.com/office/mac/drawingml/2011/main" val="1"/>
+            </a:ext>
+          </a:extLst>
+        </p:spPr>
+        <p:txBody>
+          <a:bodyPr wrap="none" lIns="71435" tIns="71435" rIns="71435" bIns="71435" anchor="ctr">
+            <a:spAutoFit/>
+          </a:bodyPr>
+          <a:lstStyle>
+            <a:lvl1pPr>
+              <a:defRPr sz="2800"/>
+            </a:lvl1pPr>
+          </a:lstStyle>
+          <a:p>
+            <a:pPr lvl="0">
+              <a:defRPr sz="1800"/>
+            </a:pPr>
+            <a:r>
+              <a:rPr lang="en-US" sz="6400" b="1" dirty="0" smtClean="0">
+                <a:latin typeface="Times New Roman"/>
+                <a:cs typeface="Times New Roman"/>
+              </a:rPr>
+              <a:t>Network Size (# Objects)</a:t>
+            </a:r>
+            <a:endParaRPr sz="6400" b="1" dirty="0">
+              <a:latin typeface="Times New Roman"/>
+              <a:cs typeface="Times New Roman"/>
+            </a:endParaRPr>
+          </a:p>
+        </p:txBody>
+      </p:sp>
+      <p:cxnSp>
+        <p:nvCxnSpPr>
+          <p:cNvPr id="3" name="Straight Arrow Connector 2"/>
+          <p:cNvCxnSpPr/>
+          <p:nvPr/>
+        </p:nvCxnSpPr>
+        <p:spPr>
+          <a:xfrm>
+            <a:off x="16441593" y="3016032"/>
+            <a:ext cx="0" cy="9087780"/>
+          </a:xfrm>
+          <a:prstGeom prst="straightConnector1">
+            <a:avLst/>
+          </a:prstGeom>
+          <a:ln w="127000">
+            <a:solidFill>
+              <a:schemeClr val="tx1"/>
+            </a:solidFill>
+            <a:tailEnd type="triangle"/>
+          </a:ln>
+          <a:effectLst/>
+        </p:spPr>
+        <p:style>
+          <a:lnRef idx="2">
+            <a:schemeClr val="accent1"/>
+          </a:lnRef>
+          <a:fillRef idx="0">
+            <a:schemeClr val="accent1"/>
+          </a:fillRef>
+          <a:effectRef idx="1">
+            <a:schemeClr val="accent1"/>
+          </a:effectRef>
+          <a:fontRef idx="minor">
+            <a:schemeClr val="tx1"/>
+          </a:fontRef>
+        </p:style>
+      </p:cxnSp>
+      <p:sp>
+        <p:nvSpPr>
+          <p:cNvPr id="25" name="Shape 174"/>
+          <p:cNvSpPr/>
+          <p:nvPr/>
+        </p:nvSpPr>
+        <p:spPr>
+          <a:xfrm rot="5400000">
+            <a:off x="14483632" y="6644439"/>
+            <a:ext cx="5825808" cy="882929"/>
+          </a:xfrm>
+          <a:prstGeom prst="rect">
+            <a:avLst/>
+          </a:prstGeom>
+          <a:ln w="12700">
+            <a:miter lim="400000"/>
+          </a:ln>
+          <a:extLst>
+            <a:ext uri="{C572A759-6A51-4108-AA02-DFA0A04FC94B}">
+              <ma14:wrappingTextBoxFlag xmlns:ma14="http://schemas.microsoft.com/office/mac/drawingml/2011/main" val="1"/>
+            </a:ext>
+          </a:extLst>
+        </p:spPr>
+        <p:txBody>
+          <a:bodyPr wrap="none" lIns="71435" tIns="71435" rIns="71435" bIns="71435" anchor="ctr">
+            <a:spAutoFit/>
+          </a:bodyPr>
+          <a:lstStyle>
+            <a:lvl1pPr>
+              <a:defRPr sz="2400"/>
+            </a:lvl1pPr>
+          </a:lstStyle>
+          <a:p>
+            <a:pPr lvl="0">
+              <a:defRPr sz="1800"/>
+            </a:pPr>
+            <a:r>
+              <a:rPr lang="en-US" sz="4800" b="1" dirty="0" smtClean="0">
+                <a:latin typeface="Times New Roman"/>
+                <a:cs typeface="Times New Roman"/>
+              </a:rPr>
+              <a:t>Decreasing Similarity</a:t>
+            </a:r>
+            <a:endParaRPr sz="4800" b="1" dirty="0">
+              <a:latin typeface="Times New Roman"/>
+              <a:cs typeface="Times New Roman"/>
+            </a:endParaRPr>
+          </a:p>
+        </p:txBody>
+      </p:sp>
+    </p:spTree>
+    <p:extLst>
+      <p:ext uri="{BB962C8B-B14F-4D97-AF65-F5344CB8AC3E}">
+        <p14:creationId xmlns:p14="http://schemas.microsoft.com/office/powerpoint/2010/main" val="205983006"/>
+      </p:ext>
+    </p:extLst>
+  </p:cSld>
+  <p:clrMapOvr>
+    <a:masterClrMapping/>
+  </p:clrMapOvr>
+  <mc:AlternateContent xmlns:mc="http://schemas.openxmlformats.org/markup-compatibility/2006">
+    <mc:Choice xmlns:p14="http://schemas.microsoft.com/office/powerpoint/2010/main" Requires="p14">
+      <p:transition spd="slow" p14:dur="2000"/>
+    </mc:Choice>
+    <mc:Fallback>
+      <p:transition xmlns:p14="http://schemas.microsoft.com/office/powerpoint/2010/main" spd="slow"/>
+    </mc:Fallback>
+  </mc:AlternateContent>
+</p:sld>
+</file>
+
+<file path=ppt/slides/slide7.xml><?xml version="1.0" encoding="utf-8"?>
+<p:sld xmlns:a="http://schemas.openxmlformats.org/drawingml/2006/main" xmlns:r="http://schemas.openxmlformats.org/officeDocument/2006/relationships" xmlns:p="http://schemas.openxmlformats.org/presentationml/2006/main">
+  <p:cSld>
+    <p:spTree>
+      <p:nvGrpSpPr>
+        <p:cNvPr id="1" name=""/>
+        <p:cNvGrpSpPr/>
+        <p:nvPr/>
+      </p:nvGrpSpPr>
+      <p:grpSpPr>
+        <a:xfrm>
+          <a:off x="0" y="0"/>
+          <a:ext cx="0" cy="0"/>
+          <a:chOff x="0" y="0"/>
+          <a:chExt cx="0" cy="0"/>
+        </a:xfrm>
+      </p:grpSpPr>
+      <p:graphicFrame>
+        <p:nvGraphicFramePr>
+          <p:cNvPr id="2" name="Table 1"/>
+          <p:cNvGraphicFramePr>
+            <a:graphicFrameLocks noGrp="1"/>
+          </p:cNvGraphicFramePr>
+          <p:nvPr>
+            <p:extLst>
+              <p:ext uri="{D42A27DB-BD31-4B8C-83A1-F6EECF244321}">
+                <p14:modId xmlns:p14="http://schemas.microsoft.com/office/powerpoint/2010/main" val="2892127758"/>
+              </p:ext>
+            </p:extLst>
+          </p:nvPr>
+        </p:nvGraphicFramePr>
+        <p:xfrm>
+          <a:off x="2730505" y="3365502"/>
+          <a:ext cx="12858750" cy="6540508"/>
+        </p:xfrm>
+        <a:graphic>
+          <a:graphicData uri="http://schemas.openxmlformats.org/drawingml/2006/table">
+            <a:tbl>
+              <a:tblPr firstRow="1" bandRow="1">
+                <a:tableStyleId>{5940675A-B579-460E-94D1-54222C63F5DA}</a:tableStyleId>
+              </a:tblPr>
+              <a:tblGrid>
+                <a:gridCol w="4286250"/>
+                <a:gridCol w="4286250"/>
+                <a:gridCol w="4286250"/>
+              </a:tblGrid>
+              <a:tr h="1574566">
+                <a:tc>
+                  <a:txBody>
+                    <a:bodyPr/>
+                    <a:lstStyle/>
+                    <a:p>
+                      <a:pPr algn="ctr"/>
+                      <a:r>
+                        <a:rPr lang="en-US" sz="3600" b="1" u="sng" dirty="0" smtClean="0"/>
+                        <a:t>Metric</a:t>
+                      </a:r>
+                      <a:endParaRPr lang="en-US" sz="3600" b="1" u="sng" dirty="0"/>
+                    </a:p>
+                  </a:txBody>
+                  <a:tcPr/>
+                </a:tc>
+                <a:tc>
+                  <a:txBody>
+                    <a:bodyPr/>
+                    <a:lstStyle/>
+                    <a:p>
+                      <a:pPr algn="ctr"/>
+                      <a:r>
+                        <a:rPr lang="en-US" sz="3600" b="1" u="sng" dirty="0" smtClean="0"/>
+                        <a:t>Best</a:t>
+                      </a:r>
+                      <a:r>
+                        <a:rPr lang="en-US" sz="3600" b="1" u="sng" baseline="0" dirty="0" smtClean="0"/>
+                        <a:t> of 2014 SHREC Challenge</a:t>
+                      </a:r>
+                      <a:endParaRPr lang="en-US" sz="3600" b="1" u="sng" dirty="0"/>
+                    </a:p>
+                  </a:txBody>
+                  <a:tcPr/>
+                </a:tc>
+                <a:tc>
+                  <a:txBody>
+                    <a:bodyPr/>
+                    <a:lstStyle/>
+                    <a:p>
+                      <a:pPr algn="ctr"/>
+                      <a:r>
+                        <a:rPr lang="en-US" sz="3600" b="1" u="sng" dirty="0" smtClean="0"/>
+                        <a:t>Our CNN-based</a:t>
+                      </a:r>
+                      <a:r>
+                        <a:rPr lang="en-US" sz="3600" b="1" u="sng" baseline="0" dirty="0" smtClean="0"/>
+                        <a:t> Method</a:t>
+                      </a:r>
+                      <a:endParaRPr lang="en-US" sz="3600" b="1" u="sng" dirty="0"/>
+                    </a:p>
+                  </a:txBody>
+                  <a:tcPr/>
+                </a:tc>
+              </a:tr>
+              <a:tr h="847844">
+                <a:tc>
+                  <a:txBody>
+                    <a:bodyPr/>
+                    <a:lstStyle/>
+                    <a:p>
+                      <a:pPr algn="ctr"/>
+                      <a:r>
+                        <a:rPr lang="en-US" sz="3600" dirty="0" smtClean="0"/>
+                        <a:t>Nearest Neighbor</a:t>
+                      </a:r>
+                      <a:endParaRPr lang="en-US" sz="3600" dirty="0"/>
+                    </a:p>
+                  </a:txBody>
+                  <a:tcPr/>
+                </a:tc>
+                <a:tc>
+                  <a:txBody>
+                    <a:bodyPr/>
+                    <a:lstStyle/>
+                    <a:p>
+                      <a:pPr algn="ctr"/>
+                      <a:r>
+                        <a:rPr lang="en-US" sz="3600" b="1" dirty="0" smtClean="0"/>
+                        <a:t>0.868</a:t>
+                      </a:r>
+                      <a:endParaRPr lang="en-US" sz="3600" b="1" dirty="0"/>
+                    </a:p>
+                  </a:txBody>
+                  <a:tcPr/>
+                </a:tc>
+                <a:tc>
+                  <a:txBody>
+                    <a:bodyPr/>
+                    <a:lstStyle/>
+                    <a:p>
+                      <a:pPr algn="ctr"/>
+                      <a:r>
+                        <a:rPr lang="en-US" sz="3600" dirty="0" smtClean="0"/>
+                        <a:t>0.867</a:t>
+                      </a:r>
+                      <a:endParaRPr lang="en-US" sz="3600" dirty="0"/>
+                    </a:p>
+                  </a:txBody>
+                  <a:tcPr/>
+                </a:tc>
+              </a:tr>
+              <a:tr h="847844">
+                <a:tc>
+                  <a:txBody>
+                    <a:bodyPr/>
+                    <a:lstStyle/>
+                    <a:p>
+                      <a:pPr algn="ctr"/>
+                      <a:r>
+                        <a:rPr lang="en-US" sz="3600" dirty="0" smtClean="0"/>
+                        <a:t>First Tier</a:t>
+                      </a:r>
+                      <a:endParaRPr lang="en-US" sz="3600" dirty="0"/>
+                    </a:p>
+                  </a:txBody>
+                  <a:tcPr/>
+                </a:tc>
+                <a:tc>
+                  <a:txBody>
+                    <a:bodyPr/>
+                    <a:lstStyle/>
+                    <a:p>
+                      <a:pPr algn="ctr"/>
+                      <a:r>
+                        <a:rPr lang="en-US" sz="3600" dirty="0" smtClean="0"/>
+                        <a:t>0.528</a:t>
+                      </a:r>
+                      <a:endParaRPr lang="en-US" sz="3600" dirty="0"/>
+                    </a:p>
+                  </a:txBody>
+                  <a:tcPr/>
+                </a:tc>
+                <a:tc>
+                  <a:txBody>
+                    <a:bodyPr/>
+                    <a:lstStyle/>
+                    <a:p>
+                      <a:pPr algn="ctr"/>
+                      <a:r>
+                        <a:rPr lang="en-US" sz="3600" b="1" dirty="0" smtClean="0"/>
+                        <a:t>0.542</a:t>
+                      </a:r>
+                      <a:endParaRPr lang="en-US" sz="3600" b="1" dirty="0"/>
+                    </a:p>
+                  </a:txBody>
+                  <a:tcPr/>
+                </a:tc>
+              </a:tr>
+              <a:tr h="847844">
+                <a:tc>
+                  <a:txBody>
+                    <a:bodyPr/>
+                    <a:lstStyle/>
+                    <a:p>
+                      <a:pPr algn="ctr"/>
+                      <a:r>
+                        <a:rPr lang="en-US" sz="3600" dirty="0" smtClean="0"/>
+                        <a:t>Second Tier</a:t>
+                      </a:r>
+                      <a:endParaRPr lang="en-US" sz="3600" dirty="0"/>
+                    </a:p>
+                  </a:txBody>
+                  <a:tcPr/>
+                </a:tc>
+                <a:tc>
+                  <a:txBody>
+                    <a:bodyPr/>
+                    <a:lstStyle/>
+                    <a:p>
+                      <a:pPr algn="ctr"/>
+                      <a:r>
+                        <a:rPr lang="en-US" sz="3600" dirty="0" smtClean="0"/>
+                        <a:t>0.661</a:t>
+                      </a:r>
+                      <a:endParaRPr lang="en-US" sz="3600" dirty="0"/>
+                    </a:p>
+                  </a:txBody>
+                  <a:tcPr/>
+                </a:tc>
+                <a:tc>
+                  <a:txBody>
+                    <a:bodyPr/>
+                    <a:lstStyle/>
+                    <a:p>
+                      <a:pPr algn="ctr"/>
+                      <a:r>
+                        <a:rPr lang="en-US" sz="3600" b="1" dirty="0" smtClean="0"/>
+                        <a:t>0.682</a:t>
+                      </a:r>
+                      <a:endParaRPr lang="en-US" sz="3600" b="1" dirty="0"/>
+                    </a:p>
+                  </a:txBody>
+                  <a:tcPr/>
+                </a:tc>
+              </a:tr>
+              <a:tr h="847844">
+                <a:tc>
+                  <a:txBody>
+                    <a:bodyPr/>
+                    <a:lstStyle/>
+                    <a:p>
+                      <a:pPr algn="ctr"/>
+                      <a:r>
+                        <a:rPr lang="en-US" sz="3600" dirty="0" smtClean="0"/>
+                        <a:t>E-Measure</a:t>
+                      </a:r>
+                      <a:endParaRPr lang="en-US" sz="3600" dirty="0"/>
+                    </a:p>
+                  </a:txBody>
+                  <a:tcPr/>
+                </a:tc>
+                <a:tc>
+                  <a:txBody>
+                    <a:bodyPr/>
+                    <a:lstStyle/>
+                    <a:p>
+                      <a:pPr algn="ctr"/>
+                      <a:r>
+                        <a:rPr lang="en-US" sz="3600" dirty="0" smtClean="0"/>
+                        <a:t>0.255</a:t>
+                      </a:r>
+                      <a:endParaRPr lang="en-US" sz="3600" dirty="0"/>
+                    </a:p>
+                  </a:txBody>
+                  <a:tcPr/>
+                </a:tc>
+                <a:tc>
+                  <a:txBody>
+                    <a:bodyPr/>
+                    <a:lstStyle/>
+                    <a:p>
+                      <a:pPr algn="ctr"/>
+                      <a:r>
+                        <a:rPr lang="en-US" sz="3600" b="1" dirty="0" smtClean="0"/>
+                        <a:t>0.260</a:t>
+                      </a:r>
+                      <a:endParaRPr lang="en-US" sz="3600" b="1" dirty="0"/>
+                    </a:p>
+                  </a:txBody>
+                  <a:tcPr/>
+                </a:tc>
+              </a:tr>
+              <a:tr h="1574566">
+                <a:tc>
+                  <a:txBody>
+                    <a:bodyPr/>
+                    <a:lstStyle/>
+                    <a:p>
+                      <a:pPr algn="ctr"/>
+                      <a:r>
+                        <a:rPr lang="en-US" sz="3600" dirty="0" smtClean="0"/>
+                        <a:t>Discounted Cumulated Gain</a:t>
+                      </a:r>
+                      <a:endParaRPr lang="en-US" sz="3600" dirty="0"/>
+                    </a:p>
+                  </a:txBody>
+                  <a:tcPr/>
+                </a:tc>
+                <a:tc>
+                  <a:txBody>
+                    <a:bodyPr/>
+                    <a:lstStyle/>
+                    <a:p>
+                      <a:pPr algn="ctr"/>
+                      <a:r>
+                        <a:rPr lang="en-US" sz="3600" dirty="0" smtClean="0"/>
+                        <a:t>0.823</a:t>
+                      </a:r>
+                      <a:endParaRPr lang="en-US" sz="3600" dirty="0"/>
+                    </a:p>
+                  </a:txBody>
+                  <a:tcPr/>
+                </a:tc>
+                <a:tc>
+                  <a:txBody>
+                    <a:bodyPr/>
+                    <a:lstStyle/>
+                    <a:p>
+                      <a:pPr algn="ctr"/>
+                      <a:r>
+                        <a:rPr lang="en-US" sz="3600" b="1" dirty="0" smtClean="0"/>
+                        <a:t>0.837</a:t>
+                      </a:r>
+                      <a:endParaRPr lang="en-US" sz="3600" b="1" dirty="0"/>
+                    </a:p>
+                  </a:txBody>
+                  <a:tcPr/>
+                </a:tc>
+              </a:tr>
+            </a:tbl>
+          </a:graphicData>
+        </a:graphic>
+      </p:graphicFrame>
+    </p:spTree>
+    <p:extLst>
+      <p:ext uri="{BB962C8B-B14F-4D97-AF65-F5344CB8AC3E}">
+        <p14:creationId xmlns:p14="http://schemas.microsoft.com/office/powerpoint/2010/main" val="957754530"/>
+      </p:ext>
+    </p:extLst>
+  </p:cSld>
+  <p:clrMapOvr>
+    <a:masterClrMapping/>
+  </p:clrMapOvr>
+</p:sld>
+</file>
+
+<file path=ppt/slides/slide8.xml><?xml version="1.0" encoding="utf-8"?>
+<p:sld xmlns:a="http://schemas.openxmlformats.org/drawingml/2006/main" xmlns:r="http://schemas.openxmlformats.org/officeDocument/2006/relationships" xmlns:p="http://schemas.openxmlformats.org/presentationml/2006/main">
+  <p:cSld>
+    <p:spTree>
+      <p:nvGrpSpPr>
+        <p:cNvPr id="1" name=""/>
+        <p:cNvGrpSpPr/>
+        <p:nvPr/>
+      </p:nvGrpSpPr>
+      <p:grpSpPr>
+        <a:xfrm>
+          <a:off x="0" y="0"/>
+          <a:ext cx="0" cy="0"/>
+          <a:chOff x="0" y="0"/>
+          <a:chExt cx="0" cy="0"/>
+        </a:xfrm>
+      </p:grpSpPr>
+      <p:graphicFrame>
+        <p:nvGraphicFramePr>
+          <p:cNvPr id="3" name="Table 2"/>
+          <p:cNvGraphicFramePr>
+            <a:graphicFrameLocks noGrp="1"/>
+          </p:cNvGraphicFramePr>
+          <p:nvPr>
+            <p:extLst>
+              <p:ext uri="{D42A27DB-BD31-4B8C-83A1-F6EECF244321}">
+                <p14:modId xmlns:p14="http://schemas.microsoft.com/office/powerpoint/2010/main" val="1274105204"/>
+              </p:ext>
+            </p:extLst>
+          </p:nvPr>
+        </p:nvGraphicFramePr>
+        <p:xfrm>
+          <a:off x="2019304" y="1003303"/>
+          <a:ext cx="13804898" cy="7709134"/>
+        </p:xfrm>
+        <a:graphic>
+          <a:graphicData uri="http://schemas.openxmlformats.org/drawingml/2006/table">
+            <a:tbl>
+              <a:tblPr firstRow="1" bandRow="1">
+                <a:tableStyleId>{5940675A-B579-460E-94D1-54222C63F5DA}</a:tableStyleId>
+              </a:tblPr>
+              <a:tblGrid>
+                <a:gridCol w="4508498"/>
+                <a:gridCol w="3403600"/>
+                <a:gridCol w="2441576"/>
+                <a:gridCol w="3451224"/>
+              </a:tblGrid>
+              <a:tr h="952500">
+                <a:tc>
+                  <a:txBody>
+                    <a:bodyPr/>
+                    <a:lstStyle/>
+                    <a:p>
+                      <a:pPr algn="ctr"/>
+                      <a:r>
+                        <a:rPr lang="en-US" sz="3600" b="1" u="sng" dirty="0" smtClean="0"/>
+                        <a:t>Dataset</a:t>
+                      </a:r>
+                      <a:endParaRPr lang="en-US" sz="3600" b="1" u="sng" dirty="0"/>
+                    </a:p>
+                  </a:txBody>
+                  <a:tcPr/>
+                </a:tc>
+                <a:tc>
+                  <a:txBody>
+                    <a:bodyPr/>
+                    <a:lstStyle/>
+                    <a:p>
+                      <a:pPr algn="ctr"/>
+                      <a:r>
+                        <a:rPr lang="en-US" sz="3600" b="1" u="sng" dirty="0" smtClean="0"/>
+                        <a:t># Models</a:t>
+                      </a:r>
+                      <a:endParaRPr lang="en-US" sz="3600" b="1" u="sng" dirty="0"/>
+                    </a:p>
+                  </a:txBody>
+                  <a:tcPr/>
+                </a:tc>
+                <a:tc>
+                  <a:txBody>
+                    <a:bodyPr/>
+                    <a:lstStyle/>
+                    <a:p>
+                      <a:pPr algn="ctr"/>
+                      <a:r>
+                        <a:rPr lang="en-US" sz="3600" b="1" u="sng" dirty="0" smtClean="0"/>
+                        <a:t>Synthetic?</a:t>
+                      </a:r>
+                      <a:endParaRPr lang="en-US" sz="3600" b="1" u="sng" dirty="0"/>
+                    </a:p>
+                  </a:txBody>
+                  <a:tcPr/>
+                </a:tc>
+                <a:tc>
+                  <a:txBody>
+                    <a:bodyPr/>
+                    <a:lstStyle/>
+                    <a:p>
+                      <a:pPr algn="ctr"/>
+                      <a:r>
+                        <a:rPr lang="en-US" sz="3600" b="1" u="sng" dirty="0" smtClean="0"/>
+                        <a:t># </a:t>
+                      </a:r>
+                      <a:r>
+                        <a:rPr lang="en-US" sz="3600" b="1" u="sng" baseline="0" dirty="0" smtClean="0"/>
+                        <a:t>Categories</a:t>
+                      </a:r>
+                      <a:endParaRPr lang="en-US" sz="3600" b="1" u="sng" dirty="0"/>
+                    </a:p>
+                  </a:txBody>
+                  <a:tcPr/>
+                </a:tc>
+              </a:tr>
+              <a:tr h="847844">
+                <a:tc>
+                  <a:txBody>
+                    <a:bodyPr/>
+                    <a:lstStyle/>
+                    <a:p>
+                      <a:pPr algn="ctr"/>
+                      <a:r>
+                        <a:rPr lang="en-US" sz="3600" dirty="0" smtClean="0"/>
+                        <a:t>KIT</a:t>
+                      </a:r>
+                      <a:r>
+                        <a:rPr lang="en-US" sz="3600" baseline="0" dirty="0" smtClean="0"/>
+                        <a:t> Object Database</a:t>
+                      </a:r>
+                      <a:endParaRPr lang="en-US" sz="3600" dirty="0"/>
+                    </a:p>
+                  </a:txBody>
+                  <a:tcPr/>
+                </a:tc>
+                <a:tc>
+                  <a:txBody>
+                    <a:bodyPr/>
+                    <a:lstStyle/>
+                    <a:p>
+                      <a:pPr algn="ctr"/>
+                      <a:r>
+                        <a:rPr lang="en-US" sz="3600" b="0" dirty="0" smtClean="0"/>
+                        <a:t>129</a:t>
+                      </a:r>
+                      <a:endParaRPr lang="en-US" sz="3600" b="0" dirty="0"/>
+                    </a:p>
+                  </a:txBody>
+                  <a:tcPr/>
+                </a:tc>
+                <a:tc>
+                  <a:txBody>
+                    <a:bodyPr/>
+                    <a:lstStyle/>
+                    <a:p>
+                      <a:pPr algn="ctr"/>
+                      <a:r>
+                        <a:rPr lang="en-US" sz="3600" b="0" dirty="0" smtClean="0"/>
+                        <a:t>N</a:t>
+                      </a:r>
+                      <a:endParaRPr lang="en-US" sz="3600" b="0" dirty="0"/>
+                    </a:p>
+                  </a:txBody>
+                  <a:tcPr/>
+                </a:tc>
+                <a:tc>
+                  <a:txBody>
+                    <a:bodyPr/>
+                    <a:lstStyle/>
+                    <a:p>
+                      <a:pPr algn="ctr"/>
+                      <a:r>
+                        <a:rPr lang="en-US" sz="3600" dirty="0" smtClean="0"/>
+                        <a:t>N/A</a:t>
+                      </a:r>
+                      <a:endParaRPr lang="en-US" sz="3600" dirty="0"/>
+                    </a:p>
+                  </a:txBody>
+                  <a:tcPr/>
+                </a:tc>
+              </a:tr>
+              <a:tr h="1188720">
+                <a:tc>
+                  <a:txBody>
+                    <a:bodyPr/>
+                    <a:lstStyle/>
+                    <a:p>
+                      <a:pPr algn="ctr"/>
+                      <a:r>
+                        <a:rPr lang="en-US" sz="3600" dirty="0" smtClean="0"/>
+                        <a:t>Amazon Picking Challenge</a:t>
+                      </a:r>
+                      <a:endParaRPr lang="en-US" sz="3600" dirty="0"/>
+                    </a:p>
+                  </a:txBody>
+                  <a:tcPr/>
+                </a:tc>
+                <a:tc>
+                  <a:txBody>
+                    <a:bodyPr/>
+                    <a:lstStyle/>
+                    <a:p>
+                      <a:pPr algn="ctr"/>
+                      <a:r>
+                        <a:rPr lang="en-US" sz="3600" b="0" dirty="0" smtClean="0"/>
+                        <a:t>26</a:t>
+                      </a:r>
+                      <a:endParaRPr lang="en-US" sz="3600" b="0" dirty="0"/>
+                    </a:p>
+                  </a:txBody>
+                  <a:tcPr/>
+                </a:tc>
+                <a:tc>
+                  <a:txBody>
+                    <a:bodyPr/>
+                    <a:lstStyle/>
+                    <a:p>
+                      <a:pPr algn="ctr"/>
+                      <a:r>
+                        <a:rPr lang="en-US" sz="3600" b="0" dirty="0" smtClean="0"/>
+                        <a:t>N</a:t>
+                      </a:r>
+                      <a:endParaRPr lang="en-US" sz="3600" b="0" dirty="0"/>
+                    </a:p>
+                  </a:txBody>
+                  <a:tcPr/>
+                </a:tc>
+                <a:tc>
+                  <a:txBody>
+                    <a:bodyPr/>
+                    <a:lstStyle/>
+                    <a:p>
+                      <a:pPr marL="0" marR="0" indent="0" algn="ctr" defTabSz="914400" rtl="0" eaLnBrk="1" fontAlgn="auto" latinLnBrk="0" hangingPunct="1">
+                        <a:lnSpc>
+                          <a:spcPct val="100000"/>
+                        </a:lnSpc>
+                        <a:spcBef>
+                          <a:spcPts val="0"/>
+                        </a:spcBef>
+                        <a:spcAft>
+                          <a:spcPts val="0"/>
+                        </a:spcAft>
+                        <a:buClrTx/>
+                        <a:buSzTx/>
+                        <a:buFontTx/>
+                        <a:buNone/>
+                        <a:tabLst/>
+                        <a:defRPr/>
+                      </a:pPr>
+                      <a:r>
+                        <a:rPr lang="en-US" sz="3600" dirty="0" smtClean="0"/>
+                        <a:t>N/A</a:t>
+                      </a:r>
+                    </a:p>
+                  </a:txBody>
+                  <a:tcPr/>
+                </a:tc>
+              </a:tr>
+              <a:tr h="847844">
+                <a:tc>
+                  <a:txBody>
+                    <a:bodyPr/>
+                    <a:lstStyle/>
+                    <a:p>
+                      <a:pPr algn="ctr"/>
+                      <a:r>
+                        <a:rPr lang="en-US" sz="3600" dirty="0" err="1" smtClean="0"/>
+                        <a:t>BigBIRD</a:t>
+                      </a:r>
+                      <a:endParaRPr lang="en-US" sz="3600" dirty="0"/>
+                    </a:p>
+                  </a:txBody>
+                  <a:tcPr/>
+                </a:tc>
+                <a:tc>
+                  <a:txBody>
+                    <a:bodyPr/>
+                    <a:lstStyle/>
+                    <a:p>
+                      <a:pPr algn="ctr"/>
+                      <a:r>
+                        <a:rPr lang="en-US" sz="3600" b="0" dirty="0" smtClean="0"/>
+                        <a:t>120</a:t>
+                      </a:r>
+                      <a:endParaRPr lang="en-US" sz="3600" b="0" dirty="0"/>
+                    </a:p>
+                  </a:txBody>
+                  <a:tcPr/>
+                </a:tc>
+                <a:tc>
+                  <a:txBody>
+                    <a:bodyPr/>
+                    <a:lstStyle/>
+                    <a:p>
+                      <a:pPr algn="ctr"/>
+                      <a:r>
+                        <a:rPr lang="en-US" sz="3600" b="0" dirty="0" smtClean="0"/>
+                        <a:t>N</a:t>
+                      </a:r>
+                      <a:endParaRPr lang="en-US" sz="3600" b="0" dirty="0"/>
+                    </a:p>
+                  </a:txBody>
+                  <a:tcPr/>
+                </a:tc>
+                <a:tc>
+                  <a:txBody>
+                    <a:bodyPr/>
+                    <a:lstStyle/>
+                    <a:p>
+                      <a:pPr marL="0" marR="0" indent="0" algn="ctr" defTabSz="914400" rtl="0" eaLnBrk="1" fontAlgn="auto" latinLnBrk="0" hangingPunct="1">
+                        <a:lnSpc>
+                          <a:spcPct val="100000"/>
+                        </a:lnSpc>
+                        <a:spcBef>
+                          <a:spcPts val="0"/>
+                        </a:spcBef>
+                        <a:spcAft>
+                          <a:spcPts val="0"/>
+                        </a:spcAft>
+                        <a:buClrTx/>
+                        <a:buSzTx/>
+                        <a:buFontTx/>
+                        <a:buNone/>
+                        <a:tabLst/>
+                        <a:defRPr/>
+                      </a:pPr>
+                      <a:r>
+                        <a:rPr lang="en-US" sz="3600" dirty="0" smtClean="0"/>
+                        <a:t>N/A</a:t>
+                      </a:r>
+                    </a:p>
+                  </a:txBody>
+                  <a:tcPr/>
+                </a:tc>
+              </a:tr>
+              <a:tr h="847844">
+                <a:tc>
+                  <a:txBody>
+                    <a:bodyPr/>
+                    <a:lstStyle/>
+                    <a:p>
+                      <a:pPr algn="ctr"/>
+                      <a:r>
+                        <a:rPr lang="en-US" sz="3600" dirty="0" smtClean="0"/>
+                        <a:t>YCB</a:t>
+                      </a:r>
+                      <a:endParaRPr lang="en-US" sz="3600" dirty="0"/>
+                    </a:p>
+                  </a:txBody>
+                  <a:tcPr/>
+                </a:tc>
+                <a:tc>
+                  <a:txBody>
+                    <a:bodyPr/>
+                    <a:lstStyle/>
+                    <a:p>
+                      <a:pPr algn="ctr"/>
+                      <a:r>
+                        <a:rPr lang="en-US" sz="3600" b="0" dirty="0" smtClean="0"/>
+                        <a:t>80</a:t>
+                      </a:r>
+                      <a:endParaRPr lang="en-US" sz="3600" b="0" dirty="0"/>
+                    </a:p>
+                  </a:txBody>
+                  <a:tcPr/>
+                </a:tc>
+                <a:tc>
+                  <a:txBody>
+                    <a:bodyPr/>
+                    <a:lstStyle/>
+                    <a:p>
+                      <a:pPr algn="ctr"/>
+                      <a:r>
+                        <a:rPr lang="en-US" sz="3600" b="0" dirty="0" smtClean="0"/>
+                        <a:t>N</a:t>
+                      </a:r>
+                      <a:endParaRPr lang="en-US" sz="3600" b="0" dirty="0"/>
+                    </a:p>
+                  </a:txBody>
+                  <a:tcPr/>
+                </a:tc>
+                <a:tc>
+                  <a:txBody>
+                    <a:bodyPr/>
+                    <a:lstStyle/>
+                    <a:p>
+                      <a:pPr marL="0" marR="0" indent="0" algn="ctr" defTabSz="914400" rtl="0" eaLnBrk="1" fontAlgn="auto" latinLnBrk="0" hangingPunct="1">
+                        <a:lnSpc>
+                          <a:spcPct val="100000"/>
+                        </a:lnSpc>
+                        <a:spcBef>
+                          <a:spcPts val="0"/>
+                        </a:spcBef>
+                        <a:spcAft>
+                          <a:spcPts val="0"/>
+                        </a:spcAft>
+                        <a:buClrTx/>
+                        <a:buSzTx/>
+                        <a:buFontTx/>
+                        <a:buNone/>
+                        <a:tabLst/>
+                        <a:defRPr/>
+                      </a:pPr>
+                      <a:r>
+                        <a:rPr lang="en-US" sz="3600" dirty="0" smtClean="0"/>
+                        <a:t>N/A</a:t>
+                      </a:r>
+                    </a:p>
+                  </a:txBody>
+                  <a:tcPr/>
+                </a:tc>
+              </a:tr>
+              <a:tr h="865148">
+                <a:tc>
+                  <a:txBody>
+                    <a:bodyPr/>
+                    <a:lstStyle/>
+                    <a:p>
+                      <a:pPr algn="ctr"/>
+                      <a:r>
+                        <a:rPr lang="en-US" sz="3600" dirty="0" smtClean="0"/>
+                        <a:t>3D Net</a:t>
+                      </a:r>
+                      <a:endParaRPr lang="en-US" sz="3600" dirty="0"/>
+                    </a:p>
+                  </a:txBody>
+                  <a:tcPr/>
+                </a:tc>
+                <a:tc>
+                  <a:txBody>
+                    <a:bodyPr/>
+                    <a:lstStyle/>
+                    <a:p>
+                      <a:pPr algn="ctr"/>
+                      <a:r>
+                        <a:rPr lang="en-US" sz="3600" b="0" dirty="0" smtClean="0"/>
+                        <a:t>1371</a:t>
+                      </a:r>
+                      <a:endParaRPr lang="en-US" sz="3600" b="0" dirty="0"/>
+                    </a:p>
+                  </a:txBody>
+                  <a:tcPr/>
+                </a:tc>
+                <a:tc>
+                  <a:txBody>
+                    <a:bodyPr/>
+                    <a:lstStyle/>
+                    <a:p>
+                      <a:pPr algn="ctr"/>
+                      <a:r>
+                        <a:rPr lang="en-US" sz="3600" b="0" dirty="0" smtClean="0"/>
+                        <a:t>Y</a:t>
+                      </a:r>
+                      <a:endParaRPr lang="en-US" sz="3600" b="0" dirty="0"/>
+                    </a:p>
+                  </a:txBody>
+                  <a:tcPr/>
+                </a:tc>
+                <a:tc>
+                  <a:txBody>
+                    <a:bodyPr/>
+                    <a:lstStyle/>
+                    <a:p>
+                      <a:pPr algn="ctr"/>
+                      <a:r>
+                        <a:rPr lang="en-US" sz="3600" b="0" dirty="0" smtClean="0"/>
+                        <a:t>50</a:t>
+                      </a:r>
+                      <a:endParaRPr lang="en-US" sz="3600" b="0" dirty="0"/>
+                    </a:p>
+                  </a:txBody>
+                  <a:tcPr/>
+                </a:tc>
+              </a:tr>
+              <a:tr h="1295400">
+                <a:tc>
+                  <a:txBody>
+                    <a:bodyPr/>
+                    <a:lstStyle/>
+                    <a:p>
+                      <a:pPr algn="ctr"/>
+                      <a:r>
+                        <a:rPr lang="en-US" sz="3600" dirty="0" smtClean="0"/>
+                        <a:t>SHREC 2014 Large</a:t>
+                      </a:r>
+                      <a:r>
+                        <a:rPr lang="en-US" sz="3600" baseline="0" dirty="0" smtClean="0"/>
+                        <a:t> Scale Challenge</a:t>
+                      </a:r>
+                      <a:endParaRPr lang="en-US" sz="3600" dirty="0"/>
+                    </a:p>
+                  </a:txBody>
+                  <a:tcPr/>
+                </a:tc>
+                <a:tc>
+                  <a:txBody>
+                    <a:bodyPr/>
+                    <a:lstStyle/>
+                    <a:p>
+                      <a:pPr algn="ctr"/>
+                      <a:r>
+                        <a:rPr lang="en-US" sz="3600" b="0" dirty="0" smtClean="0"/>
+                        <a:t>8987</a:t>
+                      </a:r>
+                      <a:endParaRPr lang="en-US" sz="3600" b="0" dirty="0"/>
+                    </a:p>
+                  </a:txBody>
+                  <a:tcPr/>
+                </a:tc>
+                <a:tc>
+                  <a:txBody>
+                    <a:bodyPr/>
+                    <a:lstStyle/>
+                    <a:p>
+                      <a:pPr algn="ctr"/>
+                      <a:r>
+                        <a:rPr lang="en-US" sz="3600" b="0" dirty="0" smtClean="0"/>
+                        <a:t>Y</a:t>
+                      </a:r>
+                      <a:endParaRPr lang="en-US" sz="3600" b="0" dirty="0"/>
+                    </a:p>
+                  </a:txBody>
+                  <a:tcPr/>
+                </a:tc>
+                <a:tc>
+                  <a:txBody>
+                    <a:bodyPr/>
+                    <a:lstStyle/>
+                    <a:p>
+                      <a:pPr algn="ctr"/>
+                      <a:r>
+                        <a:rPr lang="en-US" sz="3600" b="0" dirty="0" smtClean="0"/>
+                        <a:t>171</a:t>
+                      </a:r>
+                      <a:endParaRPr lang="en-US" sz="3600" b="0" dirty="0"/>
+                    </a:p>
+                  </a:txBody>
+                  <a:tcPr/>
+                </a:tc>
+              </a:tr>
+              <a:tr h="863834">
+                <a:tc>
+                  <a:txBody>
+                    <a:bodyPr/>
+                    <a:lstStyle/>
+                    <a:p>
+                      <a:pPr algn="ctr"/>
+                      <a:r>
+                        <a:rPr lang="en-US" sz="3600" dirty="0" err="1" smtClean="0"/>
+                        <a:t>ModelNet</a:t>
+                      </a:r>
+                      <a:endParaRPr lang="en-US" sz="3600" dirty="0"/>
+                    </a:p>
+                  </a:txBody>
+                  <a:tcPr/>
+                </a:tc>
+                <a:tc>
+                  <a:txBody>
+                    <a:bodyPr/>
+                    <a:lstStyle/>
+                    <a:p>
+                      <a:pPr algn="ctr"/>
+                      <a:r>
+                        <a:rPr lang="en-US" sz="3600" b="0" dirty="0" smtClean="0"/>
+                        <a:t>9449</a:t>
+                      </a:r>
+                      <a:endParaRPr lang="en-US" sz="3600" b="0" dirty="0"/>
+                    </a:p>
+                  </a:txBody>
+                  <a:tcPr/>
+                </a:tc>
+                <a:tc>
+                  <a:txBody>
+                    <a:bodyPr/>
+                    <a:lstStyle/>
+                    <a:p>
+                      <a:pPr algn="ctr"/>
+                      <a:r>
+                        <a:rPr lang="en-US" sz="3600" b="0" dirty="0" smtClean="0"/>
+                        <a:t>Y</a:t>
+                      </a:r>
+                      <a:endParaRPr lang="en-US" sz="3600" b="0" dirty="0"/>
+                    </a:p>
+                  </a:txBody>
+                  <a:tcPr/>
+                </a:tc>
+                <a:tc>
+                  <a:txBody>
+                    <a:bodyPr/>
+                    <a:lstStyle/>
+                    <a:p>
+                      <a:pPr algn="ctr"/>
+                      <a:r>
+                        <a:rPr lang="en-US" sz="3600" b="0" dirty="0" smtClean="0"/>
+                        <a:t>40</a:t>
+                      </a:r>
+                      <a:endParaRPr lang="en-US" sz="3600" b="0" dirty="0"/>
+                    </a:p>
+                  </a:txBody>
+                  <a:tcPr/>
+                </a:tc>
+              </a:tr>
+            </a:tbl>
+          </a:graphicData>
+        </a:graphic>
+      </p:graphicFrame>
+      <p:sp>
+        <p:nvSpPr>
+          <p:cNvPr id="4" name="TextBox 3"/>
+          <p:cNvSpPr txBox="1"/>
+          <p:nvPr/>
+        </p:nvSpPr>
+        <p:spPr>
+          <a:xfrm>
+            <a:off x="558801" y="2921000"/>
+            <a:ext cx="184666" cy="646332"/>
+          </a:xfrm>
+          <a:prstGeom prst="rect">
+            <a:avLst/>
+          </a:prstGeom>
+          <a:noFill/>
+        </p:spPr>
+        <p:txBody>
+          <a:bodyPr wrap="none" lIns="91440" tIns="45720" rIns="91440" bIns="45720" rtlCol="0">
+            <a:spAutoFit/>
+          </a:bodyPr>
+          <a:lstStyle/>
+          <a:p>
+            <a:endParaRPr lang="en-US" dirty="0"/>
+          </a:p>
+        </p:txBody>
+      </p:sp>
+    </p:spTree>
+    <p:extLst>
+      <p:ext uri="{BB962C8B-B14F-4D97-AF65-F5344CB8AC3E}">
+        <p14:creationId xmlns:p14="http://schemas.microsoft.com/office/powerpoint/2010/main" val="1212015191"/>
+      </p:ext>
+    </p:extLst>
+  </p:cSld>
+  <p:clrMapOvr>
+    <a:masterClrMapping/>
+  </p:clrMapOvr>
+</p:sld>
+</file>
+
+<file path=ppt/slides/slide9.xml><?xml version="1.0" encoding="utf-8"?>
+<p:sld xmlns:a="http://schemas.openxmlformats.org/drawingml/2006/main" xmlns:r="http://schemas.openxmlformats.org/officeDocument/2006/relationships" xmlns:p="http://schemas.openxmlformats.org/presentationml/2006/main">
+  <p:cSld>
+    <p:spTree>
+      <p:nvGrpSpPr>
+        <p:cNvPr id="1" name=""/>
+        <p:cNvGrpSpPr/>
+        <p:nvPr/>
+      </p:nvGrpSpPr>
+      <p:grpSpPr>
+        <a:xfrm>
+          <a:off x="0" y="0"/>
+          <a:ext cx="0" cy="0"/>
+          <a:chOff x="0" y="0"/>
+          <a:chExt cx="0" cy="0"/>
+        </a:xfrm>
+      </p:grpSpPr>
+      <p:pic>
+        <p:nvPicPr>
+          <p:cNvPr id="3" name="Picture 2" descr="snapshot98.png"/>
+          <p:cNvPicPr>
+            <a:picLocks noChangeAspect="1"/>
+          </p:cNvPicPr>
+          <p:nvPr/>
+        </p:nvPicPr>
+        <p:blipFill rotWithShape="1">
+          <a:blip r:embed="rId3">
+            <a:clrChange>
+              <a:clrFrom>
+                <a:srgbClr val="FFFFFF"/>
+              </a:clrFrom>
+              <a:clrTo>
+                <a:srgbClr val="FFFFFF">
+                  <a:alpha val="0"/>
+                </a:srgbClr>
+              </a:clrTo>
+            </a:clrChange>
+            <a:extLst>
+              <a:ext uri="{28A0092B-C50C-407E-A947-70E740481C1C}">
+                <a14:useLocalDpi xmlns:a14="http://schemas.microsoft.com/office/drawing/2010/main" val="0"/>
+              </a:ext>
+            </a:extLst>
+          </a:blip>
+          <a:srcRect l="37674" t="21270" r="28820" b="19683"/>
+          <a:stretch/>
+        </p:blipFill>
+        <p:spPr>
+          <a:xfrm>
+            <a:off x="603253" y="4381503"/>
+            <a:ext cx="6127750" cy="6762750"/>
+          </a:xfrm>
+          <a:prstGeom prst="rect">
+            <a:avLst/>
+          </a:prstGeom>
+        </p:spPr>
+      </p:pic>
+      <p:pic>
+        <p:nvPicPr>
+          <p:cNvPr id="4" name="Picture 3" descr="detergent_color_0_0_3.jpg"/>
+          <p:cNvPicPr>
+            <a:picLocks noChangeAspect="1"/>
+          </p:cNvPicPr>
+          <p:nvPr/>
+        </p:nvPicPr>
+        <p:blipFill rotWithShape="1">
+          <a:blip r:embed="rId4">
+            <a:clrChange>
+              <a:clrFrom>
+                <a:srgbClr val="FFFFFF"/>
+              </a:clrFrom>
+              <a:clrTo>
+                <a:srgbClr val="FFFFFF">
+                  <a:alpha val="0"/>
+                </a:srgbClr>
+              </a:clrTo>
+            </a:clrChange>
+            <a:extLst>
+              <a:ext uri="{28A0092B-C50C-407E-A947-70E740481C1C}">
+                <a14:useLocalDpi xmlns:a14="http://schemas.microsoft.com/office/drawing/2010/main" val="0"/>
+              </a:ext>
+            </a:extLst>
+          </a:blip>
+          <a:srcRect l="23214" t="27083" r="22322" b="25297"/>
+          <a:stretch/>
+        </p:blipFill>
+        <p:spPr>
+          <a:xfrm>
+            <a:off x="5873753" y="0"/>
+            <a:ext cx="5810250" cy="5080000"/>
+          </a:xfrm>
+          <a:prstGeom prst="rect">
+            <a:avLst/>
+          </a:prstGeom>
+        </p:spPr>
+      </p:pic>
+      <p:pic>
+        <p:nvPicPr>
+          <p:cNvPr id="5" name="Picture 4" descr="detergent_color_0_2_1.jpg"/>
+          <p:cNvPicPr>
+            <a:picLocks noChangeAspect="1"/>
+          </p:cNvPicPr>
+          <p:nvPr/>
+        </p:nvPicPr>
+        <p:blipFill rotWithShape="1">
+          <a:blip r:embed="rId5">
+            <a:clrChange>
+              <a:clrFrom>
+                <a:srgbClr val="FFFFFF"/>
+              </a:clrFrom>
+              <a:clrTo>
+                <a:srgbClr val="FFFFFF">
+                  <a:alpha val="0"/>
+                </a:srgbClr>
+              </a:clrTo>
+            </a:clrChange>
+            <a:extLst>
+              <a:ext uri="{28A0092B-C50C-407E-A947-70E740481C1C}">
+                <a14:useLocalDpi xmlns:a14="http://schemas.microsoft.com/office/drawing/2010/main" val="0"/>
+              </a:ext>
+            </a:extLst>
+          </a:blip>
+          <a:srcRect l="31483" t="33395" r="27777" b="30185"/>
+          <a:stretch/>
+        </p:blipFill>
+        <p:spPr>
+          <a:xfrm>
+            <a:off x="10801350" y="0"/>
+            <a:ext cx="5185476" cy="4635500"/>
+          </a:xfrm>
+          <a:prstGeom prst="rect">
+            <a:avLst/>
+          </a:prstGeom>
+        </p:spPr>
+      </p:pic>
+      <p:pic>
+        <p:nvPicPr>
+          <p:cNvPr id="6" name="Picture 5" descr="detergent_color_0_3_2.jpg"/>
+          <p:cNvPicPr>
+            <a:picLocks noChangeAspect="1"/>
+          </p:cNvPicPr>
+          <p:nvPr/>
+        </p:nvPicPr>
+        <p:blipFill rotWithShape="1">
+          <a:blip r:embed="rId6">
+            <a:clrChange>
+              <a:clrFrom>
+                <a:srgbClr val="FFFFFF"/>
+              </a:clrFrom>
+              <a:clrTo>
+                <a:srgbClr val="FFFFFF">
+                  <a:alpha val="0"/>
+                </a:srgbClr>
+              </a:clrTo>
+            </a:clrChange>
+            <a:extLst>
+              <a:ext uri="{28A0092B-C50C-407E-A947-70E740481C1C}">
+                <a14:useLocalDpi xmlns:a14="http://schemas.microsoft.com/office/drawing/2010/main" val="0"/>
+              </a:ext>
+            </a:extLst>
+          </a:blip>
+          <a:srcRect l="26262" t="32432" r="24273" b="28557"/>
+          <a:stretch/>
+        </p:blipFill>
+        <p:spPr>
+          <a:xfrm>
+            <a:off x="285750" y="3"/>
+            <a:ext cx="6159500" cy="4857750"/>
+          </a:xfrm>
+          <a:prstGeom prst="rect">
+            <a:avLst/>
+          </a:prstGeom>
+        </p:spPr>
+      </p:pic>
+      <p:pic>
+        <p:nvPicPr>
+          <p:cNvPr id="7" name="Picture 6" descr="teapot00.png"/>
+          <p:cNvPicPr>
+            <a:picLocks noChangeAspect="1"/>
+          </p:cNvPicPr>
+          <p:nvPr/>
+        </p:nvPicPr>
+        <p:blipFill rotWithShape="1">
+          <a:blip r:embed="rId7">
+            <a:clrChange>
+              <a:clrFrom>
+                <a:srgbClr val="FFFFFF"/>
+              </a:clrFrom>
+              <a:clrTo>
+                <a:srgbClr val="FFFFFF">
+                  <a:alpha val="0"/>
+                </a:srgbClr>
+              </a:clrTo>
+            </a:clrChange>
+            <a:extLst>
+              <a:ext uri="{28A0092B-C50C-407E-A947-70E740481C1C}">
+                <a14:useLocalDpi xmlns:a14="http://schemas.microsoft.com/office/drawing/2010/main" val="0"/>
+              </a:ext>
+            </a:extLst>
+          </a:blip>
+          <a:srcRect l="19792" t="21338" r="25695" b="19666"/>
+          <a:stretch/>
+        </p:blipFill>
+        <p:spPr>
+          <a:xfrm>
+            <a:off x="8836726" y="3251203"/>
+            <a:ext cx="9969500" cy="6191250"/>
+          </a:xfrm>
+          <a:prstGeom prst="rect">
+            <a:avLst/>
+          </a:prstGeom>
+        </p:spPr>
+      </p:pic>
+      <p:pic>
+        <p:nvPicPr>
+          <p:cNvPr id="8" name="Picture 7" descr="part00.png"/>
+          <p:cNvPicPr>
+            <a:picLocks noChangeAspect="1"/>
+          </p:cNvPicPr>
+          <p:nvPr/>
+        </p:nvPicPr>
+        <p:blipFill rotWithShape="1">
+          <a:blip r:embed="rId8">
+            <a:clrChange>
+              <a:clrFrom>
+                <a:srgbClr val="FFFFFF"/>
+              </a:clrFrom>
+              <a:clrTo>
+                <a:srgbClr val="FFFFFF">
+                  <a:alpha val="0"/>
+                </a:srgbClr>
+              </a:clrTo>
+            </a:clrChange>
+            <a:extLst>
+              <a:ext uri="{28A0092B-C50C-407E-A947-70E740481C1C}">
+                <a14:useLocalDpi xmlns:a14="http://schemas.microsoft.com/office/drawing/2010/main" val="0"/>
+              </a:ext>
+            </a:extLst>
+          </a:blip>
+          <a:srcRect l="27778" t="21300" r="30278" b="21580"/>
+          <a:stretch/>
+        </p:blipFill>
+        <p:spPr>
+          <a:xfrm>
+            <a:off x="5001326" y="7080252"/>
+            <a:ext cx="7670800" cy="5994400"/>
+          </a:xfrm>
+          <a:prstGeom prst="rect">
+            <a:avLst/>
+          </a:prstGeom>
+        </p:spPr>
+      </p:pic>
+    </p:spTree>
+    <p:extLst>
+      <p:ext uri="{BB962C8B-B14F-4D97-AF65-F5344CB8AC3E}">
+        <p14:creationId xmlns:p14="http://schemas.microsoft.com/office/powerpoint/2010/main" val="77227094"/>
       </p:ext>
     </p:extLst>
   </p:cSld>
@@ -3864,4 +7545,324 @@
   </a:objectDefaults>
   <a:extraClrSchemeLst/>
 </a:theme>
+</file>
+
+<file path=ppt/theme/theme2.xml><?xml version="1.0" encoding="utf-8"?>
+<a:theme xmlns:a="http://schemas.openxmlformats.org/drawingml/2006/main" name="Office Theme">
+  <a:themeElements>
+    <a:clrScheme name="Office">
+      <a:dk1>
+        <a:sysClr val="windowText" lastClr="000000"/>
+      </a:dk1>
+      <a:lt1>
+        <a:sysClr val="window" lastClr="FFFFFF"/>
+      </a:lt1>
+      <a:dk2>
+        <a:srgbClr val="1F497D"/>
+      </a:dk2>
+      <a:lt2>
+        <a:srgbClr val="EEECE1"/>
+      </a:lt2>
+      <a:accent1>
+        <a:srgbClr val="4F81BD"/>
+      </a:accent1>
+      <a:accent2>
+        <a:srgbClr val="C0504D"/>
+      </a:accent2>
+      <a:accent3>
+        <a:srgbClr val="9BBB59"/>
+      </a:accent3>
+      <a:accent4>
+        <a:srgbClr val="8064A2"/>
+      </a:accent4>
+      <a:accent5>
+        <a:srgbClr val="4BACC6"/>
+      </a:accent5>
+      <a:accent6>
+        <a:srgbClr val="F79646"/>
+      </a:accent6>
+      <a:hlink>
+        <a:srgbClr val="0000FF"/>
+      </a:hlink>
+      <a:folHlink>
+        <a:srgbClr val="800080"/>
+      </a:folHlink>
+    </a:clrScheme>
+    <a:fontScheme name="Office">
+      <a:majorFont>
+        <a:latin typeface="Calibri"/>
+        <a:ea typeface=""/>
+        <a:cs typeface=""/>
+        <a:font script="Jpan" typeface="ＭＳ Ｐゴシック"/>
+        <a:font script="Hang" typeface="맑은 고딕"/>
+        <a:font script="Hans" typeface="宋体"/>
+        <a:font script="Hant" typeface="新細明體"/>
+        <a:font script="Arab" typeface="Times New Roman"/>
+        <a:font script="Hebr" typeface="Times New Roman"/>
+        <a:font script="Thai" typeface="Angsana New"/>
+        <a:font script="Ethi" typeface="Nyala"/>
+        <a:font script="Beng" typeface="Vrinda"/>
+        <a:font script="Gujr" typeface="Shruti"/>
+        <a:font script="Khmr" typeface="MoolBoran"/>
+        <a:font script="Knda" typeface="Tunga"/>
+        <a:font script="Guru" typeface="Raavi"/>
+        <a:font script="Cans" typeface="Euphemia"/>
+        <a:font script="Cher" typeface="Plantagenet Cherokee"/>
+        <a:font script="Yiii" typeface="Microsoft Yi Baiti"/>
+        <a:font script="Tibt" typeface="Microsoft Himalaya"/>
+        <a:font script="Thaa" typeface="MV Boli"/>
+        <a:font script="Deva" typeface="Mangal"/>
+        <a:font script="Telu" typeface="Gautami"/>
+        <a:font script="Taml" typeface="Latha"/>
+        <a:font script="Syrc" typeface="Estrangelo Edessa"/>
+        <a:font script="Orya" typeface="Kalinga"/>
+        <a:font script="Mlym" typeface="Kartika"/>
+        <a:font script="Laoo" typeface="DokChampa"/>
+        <a:font script="Sinh" typeface="Iskoola Pota"/>
+        <a:font script="Mong" typeface="Mongolian Baiti"/>
+        <a:font script="Viet" typeface="Times New Roman"/>
+        <a:font script="Uigh" typeface="Microsoft Uighur"/>
+        <a:font script="Geor" typeface="Sylfaen"/>
+      </a:majorFont>
+      <a:minorFont>
+        <a:latin typeface="Calibri"/>
+        <a:ea typeface=""/>
+        <a:cs typeface=""/>
+        <a:font script="Jpan" typeface="ＭＳ Ｐゴシック"/>
+        <a:font script="Hang" typeface="맑은 고딕"/>
+        <a:font script="Hans" typeface="宋体"/>
+        <a:font script="Hant" typeface="新細明體"/>
+        <a:font script="Arab" typeface="Arial"/>
+        <a:font script="Hebr" typeface="Arial"/>
+        <a:font script="Thai" typeface="Cordia New"/>
+        <a:font script="Ethi" typeface="Nyala"/>
+        <a:font script="Beng" typeface="Vrinda"/>
+        <a:font script="Gujr" typeface="Shruti"/>
+        <a:font script="Khmr" typeface="DaunPenh"/>
+        <a:font script="Knda" typeface="Tunga"/>
+        <a:font script="Guru" typeface="Raavi"/>
+        <a:font script="Cans" typeface="Euphemia"/>
+        <a:font script="Cher" typeface="Plantagenet Cherokee"/>
+        <a:font script="Yiii" typeface="Microsoft Yi Baiti"/>
+        <a:font script="Tibt" typeface="Microsoft Himalaya"/>
+        <a:font script="Thaa" typeface="MV Boli"/>
+        <a:font script="Deva" typeface="Mangal"/>
+        <a:font script="Telu" typeface="Gautami"/>
+        <a:font script="Taml" typeface="Latha"/>
+        <a:font script="Syrc" typeface="Estrangelo Edessa"/>
+        <a:font script="Orya" typeface="Kalinga"/>
+        <a:font script="Mlym" typeface="Kartika"/>
+        <a:font script="Laoo" typeface="DokChampa"/>
+        <a:font script="Sinh" typeface="Iskoola Pota"/>
+        <a:font script="Mong" typeface="Mongolian Baiti"/>
+        <a:font script="Viet" typeface="Arial"/>
+        <a:font script="Uigh" typeface="Microsoft Uighur"/>
+        <a:font script="Geor" typeface="Sylfaen"/>
+      </a:minorFont>
+    </a:fontScheme>
+    <a:fmtScheme name="Office">
+      <a:fillStyleLst>
+        <a:solidFill>
+          <a:schemeClr val="phClr"/>
+        </a:solidFill>
+        <a:gradFill rotWithShape="1">
+          <a:gsLst>
+            <a:gs pos="0">
+              <a:schemeClr val="phClr">
+                <a:tint val="50000"/>
+                <a:satMod val="300000"/>
+              </a:schemeClr>
+            </a:gs>
+            <a:gs pos="35000">
+              <a:schemeClr val="phClr">
+                <a:tint val="37000"/>
+                <a:satMod val="300000"/>
+              </a:schemeClr>
+            </a:gs>
+            <a:gs pos="100000">
+              <a:schemeClr val="phClr">
+                <a:tint val="15000"/>
+                <a:satMod val="350000"/>
+              </a:schemeClr>
+            </a:gs>
+          </a:gsLst>
+          <a:lin ang="16200000" scaled="1"/>
+        </a:gradFill>
+        <a:gradFill rotWithShape="1">
+          <a:gsLst>
+            <a:gs pos="0">
+              <a:schemeClr val="phClr">
+                <a:tint val="100000"/>
+                <a:shade val="100000"/>
+                <a:satMod val="130000"/>
+              </a:schemeClr>
+            </a:gs>
+            <a:gs pos="100000">
+              <a:schemeClr val="phClr">
+                <a:tint val="50000"/>
+                <a:shade val="100000"/>
+                <a:satMod val="350000"/>
+              </a:schemeClr>
+            </a:gs>
+          </a:gsLst>
+          <a:lin ang="16200000" scaled="0"/>
+        </a:gradFill>
+      </a:fillStyleLst>
+      <a:lnStyleLst>
+        <a:ln w="9525" cap="flat" cmpd="sng" algn="ctr">
+          <a:solidFill>
+            <a:schemeClr val="phClr">
+              <a:shade val="95000"/>
+              <a:satMod val="105000"/>
+            </a:schemeClr>
+          </a:solidFill>
+          <a:prstDash val="solid"/>
+        </a:ln>
+        <a:ln w="25400" cap="flat" cmpd="sng" algn="ctr">
+          <a:solidFill>
+            <a:schemeClr val="phClr"/>
+          </a:solidFill>
+          <a:prstDash val="solid"/>
+        </a:ln>
+        <a:ln w="38100" cap="flat" cmpd="sng" algn="ctr">
+          <a:solidFill>
+            <a:schemeClr val="phClr"/>
+          </a:solidFill>
+          <a:prstDash val="solid"/>
+        </a:ln>
+      </a:lnStyleLst>
+      <a:effectStyleLst>
+        <a:effectStyle>
+          <a:effectLst>
+            <a:outerShdw blurRad="40000" dist="20000" dir="5400000" rotWithShape="0">
+              <a:srgbClr val="000000">
+                <a:alpha val="38000"/>
+              </a:srgbClr>
+            </a:outerShdw>
+          </a:effectLst>
+        </a:effectStyle>
+        <a:effectStyle>
+          <a:effectLst>
+            <a:outerShdw blurRad="40000" dist="23000" dir="5400000" rotWithShape="0">
+              <a:srgbClr val="000000">
+                <a:alpha val="35000"/>
+              </a:srgbClr>
+            </a:outerShdw>
+          </a:effectLst>
+        </a:effectStyle>
+        <a:effectStyle>
+          <a:effectLst>
+            <a:outerShdw blurRad="40000" dist="23000" dir="5400000" rotWithShape="0">
+              <a:srgbClr val="000000">
+                <a:alpha val="35000"/>
+              </a:srgbClr>
+            </a:outerShdw>
+          </a:effectLst>
+          <a:scene3d>
+            <a:camera prst="orthographicFront">
+              <a:rot lat="0" lon="0" rev="0"/>
+            </a:camera>
+            <a:lightRig rig="threePt" dir="t">
+              <a:rot lat="0" lon="0" rev="1200000"/>
+            </a:lightRig>
+          </a:scene3d>
+          <a:sp3d>
+            <a:bevelT w="63500" h="25400"/>
+          </a:sp3d>
+        </a:effectStyle>
+      </a:effectStyleLst>
+      <a:bgFillStyleLst>
+        <a:solidFill>
+          <a:schemeClr val="phClr"/>
+        </a:solidFill>
+        <a:gradFill rotWithShape="1">
+          <a:gsLst>
+            <a:gs pos="0">
+              <a:schemeClr val="phClr">
+                <a:tint val="40000"/>
+                <a:satMod val="350000"/>
+              </a:schemeClr>
+            </a:gs>
+            <a:gs pos="40000">
+              <a:schemeClr val="phClr">
+                <a:tint val="45000"/>
+                <a:shade val="99000"/>
+                <a:satMod val="350000"/>
+              </a:schemeClr>
+            </a:gs>
+            <a:gs pos="100000">
+              <a:schemeClr val="phClr">
+                <a:shade val="20000"/>
+                <a:satMod val="255000"/>
+              </a:schemeClr>
+            </a:gs>
+          </a:gsLst>
+          <a:path path="circle">
+            <a:fillToRect l="50000" t="-80000" r="50000" b="180000"/>
+          </a:path>
+        </a:gradFill>
+        <a:gradFill rotWithShape="1">
+          <a:gsLst>
+            <a:gs pos="0">
+              <a:schemeClr val="phClr">
+                <a:tint val="80000"/>
+                <a:satMod val="300000"/>
+              </a:schemeClr>
+            </a:gs>
+            <a:gs pos="100000">
+              <a:schemeClr val="phClr">
+                <a:shade val="30000"/>
+                <a:satMod val="200000"/>
+              </a:schemeClr>
+            </a:gs>
+          </a:gsLst>
+          <a:path path="circle">
+            <a:fillToRect l="50000" t="50000" r="50000" b="50000"/>
+          </a:path>
+        </a:gradFill>
+      </a:bgFillStyleLst>
+    </a:fmtScheme>
+  </a:themeElements>
+  <a:objectDefaults>
+    <a:spDef>
+      <a:spPr/>
+      <a:bodyPr/>
+      <a:lstStyle/>
+      <a:style>
+        <a:lnRef idx="1">
+          <a:schemeClr val="accent1"/>
+        </a:lnRef>
+        <a:fillRef idx="3">
+          <a:schemeClr val="accent1"/>
+        </a:fillRef>
+        <a:effectRef idx="2">
+          <a:schemeClr val="accent1"/>
+        </a:effectRef>
+        <a:fontRef idx="minor">
+          <a:schemeClr val="lt1"/>
+        </a:fontRef>
+      </a:style>
+    </a:spDef>
+    <a:lnDef>
+      <a:spPr/>
+      <a:bodyPr/>
+      <a:lstStyle/>
+      <a:style>
+        <a:lnRef idx="2">
+          <a:schemeClr val="accent1"/>
+        </a:lnRef>
+        <a:fillRef idx="0">
+          <a:schemeClr val="accent1"/>
+        </a:fillRef>
+        <a:effectRef idx="1">
+          <a:schemeClr val="accent1"/>
+        </a:effectRef>
+        <a:fontRef idx="minor">
+          <a:schemeClr val="tx1"/>
+        </a:fontRef>
+      </a:style>
+    </a:lnDef>
+  </a:objectDefaults>
+  <a:extraClrSchemeLst/>
+</a:theme>
 </file>
</xml_diff>

<commit_message>
Added many new figures as well as updated text. Quite a bit closer
</commit_message>
<xml_diff>
--- a/ICRA2016/bandits_docs/figures/dexnet_figures.pptx
+++ b/ICRA2016/bandits_docs/figures/dexnet_figures.pptx
@@ -5166,7 +5166,17 @@
         </p:nvPicPr>
         <p:blipFill>
           <a:blip r:embed="rId2">
-            <a:extLst/>
+            <a:extLst>
+              <a:ext uri="{BEBA8EAE-BF5A-486C-A8C5-ECC9F3942E4B}">
+                <a14:imgProps xmlns:a14="http://schemas.microsoft.com/office/drawing/2010/main">
+                  <a14:imgLayer r:embed="rId3">
+                    <a14:imgEffect>
+                      <a14:brightnessContrast bright="40000" contrast="-40000"/>
+                    </a14:imgEffect>
+                  </a14:imgLayer>
+                </a14:imgProps>
+              </a:ext>
+            </a:extLst>
           </a:blip>
           <a:srcRect t="35267" b="35267"/>
           <a:stretch>
@@ -5193,8 +5203,18 @@
           <p:nvPr/>
         </p:nvPicPr>
         <p:blipFill>
-          <a:blip r:embed="rId3">
-            <a:extLst/>
+          <a:blip r:embed="rId4">
+            <a:extLst>
+              <a:ext uri="{BEBA8EAE-BF5A-486C-A8C5-ECC9F3942E4B}">
+                <a14:imgProps xmlns:a14="http://schemas.microsoft.com/office/drawing/2010/main">
+                  <a14:imgLayer r:embed="rId5">
+                    <a14:imgEffect>
+                      <a14:brightnessContrast bright="40000" contrast="-40000"/>
+                    </a14:imgEffect>
+                  </a14:imgLayer>
+                </a14:imgProps>
+              </a:ext>
+            </a:extLst>
           </a:blip>
           <a:srcRect t="35094" b="35094"/>
           <a:stretch>
@@ -5221,8 +5241,18 @@
           <p:nvPr/>
         </p:nvPicPr>
         <p:blipFill>
-          <a:blip r:embed="rId4">
-            <a:extLst/>
+          <a:blip r:embed="rId6">
+            <a:extLst>
+              <a:ext uri="{BEBA8EAE-BF5A-486C-A8C5-ECC9F3942E4B}">
+                <a14:imgProps xmlns:a14="http://schemas.microsoft.com/office/drawing/2010/main">
+                  <a14:imgLayer r:embed="rId7">
+                    <a14:imgEffect>
+                      <a14:brightnessContrast bright="40000" contrast="-40000"/>
+                    </a14:imgEffect>
+                  </a14:imgLayer>
+                </a14:imgProps>
+              </a:ext>
+            </a:extLst>
           </a:blip>
           <a:srcRect t="38191" b="38191"/>
           <a:stretch>
@@ -5249,8 +5279,18 @@
           <p:nvPr/>
         </p:nvPicPr>
         <p:blipFill>
-          <a:blip r:embed="rId5">
-            <a:extLst/>
+          <a:blip r:embed="rId8">
+            <a:extLst>
+              <a:ext uri="{BEBA8EAE-BF5A-486C-A8C5-ECC9F3942E4B}">
+                <a14:imgProps xmlns:a14="http://schemas.microsoft.com/office/drawing/2010/main">
+                  <a14:imgLayer r:embed="rId9">
+                    <a14:imgEffect>
+                      <a14:brightnessContrast bright="40000" contrast="-40000"/>
+                    </a14:imgEffect>
+                  </a14:imgLayer>
+                </a14:imgProps>
+              </a:ext>
+            </a:extLst>
           </a:blip>
           <a:srcRect t="36358" b="36358"/>
           <a:stretch>
@@ -5277,8 +5317,18 @@
           <p:nvPr/>
         </p:nvPicPr>
         <p:blipFill>
-          <a:blip r:embed="rId6">
-            <a:extLst/>
+          <a:blip r:embed="rId10">
+            <a:extLst>
+              <a:ext uri="{BEBA8EAE-BF5A-486C-A8C5-ECC9F3942E4B}">
+                <a14:imgProps xmlns:a14="http://schemas.microsoft.com/office/drawing/2010/main">
+                  <a14:imgLayer r:embed="rId11">
+                    <a14:imgEffect>
+                      <a14:brightnessContrast bright="40000" contrast="-40000"/>
+                    </a14:imgEffect>
+                  </a14:imgLayer>
+                </a14:imgProps>
+              </a:ext>
+            </a:extLst>
           </a:blip>
           <a:srcRect t="34593" b="34593"/>
           <a:stretch>
@@ -5305,8 +5355,18 @@
           <p:nvPr/>
         </p:nvPicPr>
         <p:blipFill>
-          <a:blip r:embed="rId7">
-            <a:extLst/>
+          <a:blip r:embed="rId12">
+            <a:extLst>
+              <a:ext uri="{BEBA8EAE-BF5A-486C-A8C5-ECC9F3942E4B}">
+                <a14:imgProps xmlns:a14="http://schemas.microsoft.com/office/drawing/2010/main">
+                  <a14:imgLayer r:embed="rId13">
+                    <a14:imgEffect>
+                      <a14:brightnessContrast bright="40000" contrast="-40000"/>
+                    </a14:imgEffect>
+                  </a14:imgLayer>
+                </a14:imgProps>
+              </a:ext>
+            </a:extLst>
           </a:blip>
           <a:srcRect t="33593" b="33593"/>
           <a:stretch>
@@ -5333,8 +5393,18 @@
           <p:nvPr/>
         </p:nvPicPr>
         <p:blipFill>
-          <a:blip r:embed="rId8">
-            <a:extLst/>
+          <a:blip r:embed="rId14">
+            <a:extLst>
+              <a:ext uri="{BEBA8EAE-BF5A-486C-A8C5-ECC9F3942E4B}">
+                <a14:imgProps xmlns:a14="http://schemas.microsoft.com/office/drawing/2010/main">
+                  <a14:imgLayer r:embed="rId15">
+                    <a14:imgEffect>
+                      <a14:brightnessContrast bright="40000" contrast="-40000"/>
+                    </a14:imgEffect>
+                  </a14:imgLayer>
+                </a14:imgProps>
+              </a:ext>
+            </a:extLst>
           </a:blip>
           <a:srcRect t="35798" b="35798"/>
           <a:stretch>
@@ -5361,8 +5431,18 @@
           <p:nvPr/>
         </p:nvPicPr>
         <p:blipFill>
-          <a:blip r:embed="rId9">
-            <a:extLst/>
+          <a:blip r:embed="rId16">
+            <a:extLst>
+              <a:ext uri="{BEBA8EAE-BF5A-486C-A8C5-ECC9F3942E4B}">
+                <a14:imgProps xmlns:a14="http://schemas.microsoft.com/office/drawing/2010/main">
+                  <a14:imgLayer r:embed="rId17">
+                    <a14:imgEffect>
+                      <a14:brightnessContrast bright="40000" contrast="-40000"/>
+                    </a14:imgEffect>
+                  </a14:imgLayer>
+                </a14:imgProps>
+              </a:ext>
+            </a:extLst>
           </a:blip>
           <a:srcRect t="38830" b="38830"/>
           <a:stretch>
@@ -5389,8 +5469,18 @@
           <p:nvPr/>
         </p:nvPicPr>
         <p:blipFill>
-          <a:blip r:embed="rId10">
-            <a:extLst/>
+          <a:blip r:embed="rId18">
+            <a:extLst>
+              <a:ext uri="{BEBA8EAE-BF5A-486C-A8C5-ECC9F3942E4B}">
+                <a14:imgProps xmlns:a14="http://schemas.microsoft.com/office/drawing/2010/main">
+                  <a14:imgLayer r:embed="rId19">
+                    <a14:imgEffect>
+                      <a14:brightnessContrast bright="40000" contrast="-40000"/>
+                    </a14:imgEffect>
+                  </a14:imgLayer>
+                </a14:imgProps>
+              </a:ext>
+            </a:extLst>
           </a:blip>
           <a:srcRect t="36835" b="36835"/>
           <a:stretch>
@@ -5417,8 +5507,18 @@
           <p:nvPr/>
         </p:nvPicPr>
         <p:blipFill>
-          <a:blip r:embed="rId11">
-            <a:extLst/>
+          <a:blip r:embed="rId20">
+            <a:extLst>
+              <a:ext uri="{BEBA8EAE-BF5A-486C-A8C5-ECC9F3942E4B}">
+                <a14:imgProps xmlns:a14="http://schemas.microsoft.com/office/drawing/2010/main">
+                  <a14:imgLayer r:embed="rId21">
+                    <a14:imgEffect>
+                      <a14:brightnessContrast bright="40000" contrast="-40000"/>
+                    </a14:imgEffect>
+                  </a14:imgLayer>
+                </a14:imgProps>
+              </a:ext>
+            </a:extLst>
           </a:blip>
           <a:srcRect t="33217" b="33217"/>
           <a:stretch>
@@ -5445,8 +5545,18 @@
           <p:nvPr/>
         </p:nvPicPr>
         <p:blipFill>
-          <a:blip r:embed="rId12">
-            <a:extLst/>
+          <a:blip r:embed="rId22">
+            <a:extLst>
+              <a:ext uri="{BEBA8EAE-BF5A-486C-A8C5-ECC9F3942E4B}">
+                <a14:imgProps xmlns:a14="http://schemas.microsoft.com/office/drawing/2010/main">
+                  <a14:imgLayer r:embed="rId23">
+                    <a14:imgEffect>
+                      <a14:brightnessContrast bright="40000" contrast="-20000"/>
+                    </a14:imgEffect>
+                  </a14:imgLayer>
+                </a14:imgProps>
+              </a:ext>
+            </a:extLst>
           </a:blip>
           <a:srcRect t="22240" b="28327"/>
           <a:stretch>
@@ -5473,8 +5583,18 @@
           <p:nvPr/>
         </p:nvPicPr>
         <p:blipFill>
-          <a:blip r:embed="rId13">
-            <a:extLst/>
+          <a:blip r:embed="rId24">
+            <a:extLst>
+              <a:ext uri="{BEBA8EAE-BF5A-486C-A8C5-ECC9F3942E4B}">
+                <a14:imgProps xmlns:a14="http://schemas.microsoft.com/office/drawing/2010/main">
+                  <a14:imgLayer r:embed="rId25">
+                    <a14:imgEffect>
+                      <a14:brightnessContrast bright="40000" contrast="-40000"/>
+                    </a14:imgEffect>
+                  </a14:imgLayer>
+                </a14:imgProps>
+              </a:ext>
+            </a:extLst>
           </a:blip>
           <a:srcRect t="30581" b="30581"/>
           <a:stretch>
@@ -5501,8 +5621,18 @@
           <p:nvPr/>
         </p:nvPicPr>
         <p:blipFill>
-          <a:blip r:embed="rId14">
-            <a:extLst/>
+          <a:blip r:embed="rId26">
+            <a:extLst>
+              <a:ext uri="{BEBA8EAE-BF5A-486C-A8C5-ECC9F3942E4B}">
+                <a14:imgProps xmlns:a14="http://schemas.microsoft.com/office/drawing/2010/main">
+                  <a14:imgLayer r:embed="rId27">
+                    <a14:imgEffect>
+                      <a14:brightnessContrast bright="40000" contrast="-40000"/>
+                    </a14:imgEffect>
+                  </a14:imgLayer>
+                </a14:imgProps>
+              </a:ext>
+            </a:extLst>
           </a:blip>
           <a:srcRect t="34559" b="34559"/>
           <a:stretch>
@@ -5529,8 +5659,18 @@
           <p:nvPr/>
         </p:nvPicPr>
         <p:blipFill>
-          <a:blip r:embed="rId15">
-            <a:extLst/>
+          <a:blip r:embed="rId28">
+            <a:extLst>
+              <a:ext uri="{BEBA8EAE-BF5A-486C-A8C5-ECC9F3942E4B}">
+                <a14:imgProps xmlns:a14="http://schemas.microsoft.com/office/drawing/2010/main">
+                  <a14:imgLayer r:embed="rId29">
+                    <a14:imgEffect>
+                      <a14:brightnessContrast bright="40000" contrast="-40000"/>
+                    </a14:imgEffect>
+                  </a14:imgLayer>
+                </a14:imgProps>
+              </a:ext>
+            </a:extLst>
           </a:blip>
           <a:srcRect t="37221" b="37221"/>
           <a:stretch>
@@ -5557,8 +5697,18 @@
           <p:nvPr/>
         </p:nvPicPr>
         <p:blipFill>
-          <a:blip r:embed="rId16">
-            <a:extLst/>
+          <a:blip r:embed="rId30">
+            <a:extLst>
+              <a:ext uri="{BEBA8EAE-BF5A-486C-A8C5-ECC9F3942E4B}">
+                <a14:imgProps xmlns:a14="http://schemas.microsoft.com/office/drawing/2010/main">
+                  <a14:imgLayer r:embed="rId31">
+                    <a14:imgEffect>
+                      <a14:brightnessContrast bright="40000" contrast="-40000"/>
+                    </a14:imgEffect>
+                  </a14:imgLayer>
+                </a14:imgProps>
+              </a:ext>
+            </a:extLst>
           </a:blip>
           <a:srcRect t="33947" b="33947"/>
           <a:stretch>
@@ -5788,8 +5938,18 @@
           <p:nvPr/>
         </p:nvPicPr>
         <p:blipFill>
-          <a:blip r:embed="rId17">
-            <a:extLst/>
+          <a:blip r:embed="rId32">
+            <a:extLst>
+              <a:ext uri="{BEBA8EAE-BF5A-486C-A8C5-ECC9F3942E4B}">
+                <a14:imgProps xmlns:a14="http://schemas.microsoft.com/office/drawing/2010/main">
+                  <a14:imgLayer r:embed="rId33">
+                    <a14:imgEffect>
+                      <a14:brightnessContrast bright="40000" contrast="-40000"/>
+                    </a14:imgEffect>
+                  </a14:imgLayer>
+                </a14:imgProps>
+              </a:ext>
+            </a:extLst>
           </a:blip>
           <a:srcRect t="36085" b="36085"/>
           <a:stretch>
@@ -5866,9 +6026,9 @@
           <p:nvPr/>
         </p:nvCxnSpPr>
         <p:spPr>
-          <a:xfrm>
-            <a:off x="16441593" y="3016032"/>
-            <a:ext cx="0" cy="9087780"/>
+          <a:xfrm flipV="1">
+            <a:off x="16441593" y="2243637"/>
+            <a:ext cx="0" cy="10197173"/>
           </a:xfrm>
           <a:prstGeom prst="straightConnector1">
             <a:avLst/>
@@ -5904,8 +6064,8 @@
         </p:nvSpPr>
         <p:spPr>
           <a:xfrm rot="5400000">
-            <a:off x="14483632" y="6644439"/>
-            <a:ext cx="5825808" cy="882929"/>
+            <a:off x="14551562" y="6644439"/>
+            <a:ext cx="5689954" cy="882929"/>
           </a:xfrm>
           <a:prstGeom prst="rect">
             <a:avLst/>
@@ -5937,7 +6097,7 @@
                 <a:latin typeface="Times New Roman"/>
                 <a:cs typeface="Times New Roman"/>
               </a:rPr>
-              <a:t>Decreasing Similarity</a:t>
+              <a:t>Increasing Similarity</a:t>
             </a:r>
             <a:endParaRPr sz="4800" b="1" dirty="0">
               <a:latin typeface="Times New Roman"/>

</xml_diff>